<commit_message>
added SIS points format download. uses csv input and merges with SIS format
</commit_message>
<xml_diff>
--- a/docs/use_cases.pptx
+++ b/docs/use_cases.pptx
@@ -6,8 +6,9 @@
   </p:sldMasterIdLst>
   <p:sldIdLst>
     <p:sldId id="256" r:id="rId2"/>
-    <p:sldId id="257" r:id="rId3"/>
-    <p:sldId id="258" r:id="rId4"/>
+    <p:sldId id="259" r:id="rId3"/>
+    <p:sldId id="257" r:id="rId4"/>
+    <p:sldId id="258" r:id="rId5"/>
   </p:sldIdLst>
   <p:sldSz cx="12192000" cy="6858000"/>
   <p:notesSz cx="6858000" cy="9144000"/>
@@ -106,6 +107,11 @@
       </a:defRPr>
     </a:lvl9pPr>
   </p:defaultTextStyle>
+  <p:extLst>
+    <p:ext uri="{EFAFB233-063F-42B5-8137-9DF3F51BA10A}">
+      <p15:sldGuideLst xmlns:p15="http://schemas.microsoft.com/office/powerpoint/2012/main"/>
+    </p:ext>
+  </p:extLst>
 </p:presentation>
 </file>
 
@@ -258,7 +264,7 @@
           <a:p>
             <a:fld id="{BF29F057-5540-425C-9A2E-DD2639D75A35}" type="datetimeFigureOut">
               <a:rPr lang="en-GB" smtClean="0"/>
-              <a:t>20/01/2023</a:t>
+              <a:t>31/01/2023</a:t>
             </a:fld>
             <a:endParaRPr lang="en-GB"/>
           </a:p>
@@ -458,7 +464,7 @@
           <a:p>
             <a:fld id="{BF29F057-5540-425C-9A2E-DD2639D75A35}" type="datetimeFigureOut">
               <a:rPr lang="en-GB" smtClean="0"/>
-              <a:t>20/01/2023</a:t>
+              <a:t>31/01/2023</a:t>
             </a:fld>
             <a:endParaRPr lang="en-GB"/>
           </a:p>
@@ -668,7 +674,7 @@
           <a:p>
             <a:fld id="{BF29F057-5540-425C-9A2E-DD2639D75A35}" type="datetimeFigureOut">
               <a:rPr lang="en-GB" smtClean="0"/>
-              <a:t>20/01/2023</a:t>
+              <a:t>31/01/2023</a:t>
             </a:fld>
             <a:endParaRPr lang="en-GB"/>
           </a:p>
@@ -868,7 +874,7 @@
           <a:p>
             <a:fld id="{BF29F057-5540-425C-9A2E-DD2639D75A35}" type="datetimeFigureOut">
               <a:rPr lang="en-GB" smtClean="0"/>
-              <a:t>20/01/2023</a:t>
+              <a:t>31/01/2023</a:t>
             </a:fld>
             <a:endParaRPr lang="en-GB"/>
           </a:p>
@@ -1144,7 +1150,7 @@
           <a:p>
             <a:fld id="{BF29F057-5540-425C-9A2E-DD2639D75A35}" type="datetimeFigureOut">
               <a:rPr lang="en-GB" smtClean="0"/>
-              <a:t>20/01/2023</a:t>
+              <a:t>31/01/2023</a:t>
             </a:fld>
             <a:endParaRPr lang="en-GB"/>
           </a:p>
@@ -1412,7 +1418,7 @@
           <a:p>
             <a:fld id="{BF29F057-5540-425C-9A2E-DD2639D75A35}" type="datetimeFigureOut">
               <a:rPr lang="en-GB" smtClean="0"/>
-              <a:t>20/01/2023</a:t>
+              <a:t>31/01/2023</a:t>
             </a:fld>
             <a:endParaRPr lang="en-GB"/>
           </a:p>
@@ -1827,7 +1833,7 @@
           <a:p>
             <a:fld id="{BF29F057-5540-425C-9A2E-DD2639D75A35}" type="datetimeFigureOut">
               <a:rPr lang="en-GB" smtClean="0"/>
-              <a:t>20/01/2023</a:t>
+              <a:t>31/01/2023</a:t>
             </a:fld>
             <a:endParaRPr lang="en-GB"/>
           </a:p>
@@ -1969,7 +1975,7 @@
           <a:p>
             <a:fld id="{BF29F057-5540-425C-9A2E-DD2639D75A35}" type="datetimeFigureOut">
               <a:rPr lang="en-GB" smtClean="0"/>
-              <a:t>20/01/2023</a:t>
+              <a:t>31/01/2023</a:t>
             </a:fld>
             <a:endParaRPr lang="en-GB"/>
           </a:p>
@@ -2082,7 +2088,7 @@
           <a:p>
             <a:fld id="{BF29F057-5540-425C-9A2E-DD2639D75A35}" type="datetimeFigureOut">
               <a:rPr lang="en-GB" smtClean="0"/>
-              <a:t>20/01/2023</a:t>
+              <a:t>31/01/2023</a:t>
             </a:fld>
             <a:endParaRPr lang="en-GB"/>
           </a:p>
@@ -2395,7 +2401,7 @@
           <a:p>
             <a:fld id="{BF29F057-5540-425C-9A2E-DD2639D75A35}" type="datetimeFigureOut">
               <a:rPr lang="en-GB" smtClean="0"/>
-              <a:t>20/01/2023</a:t>
+              <a:t>31/01/2023</a:t>
             </a:fld>
             <a:endParaRPr lang="en-GB"/>
           </a:p>
@@ -2684,7 +2690,7 @@
           <a:p>
             <a:fld id="{BF29F057-5540-425C-9A2E-DD2639D75A35}" type="datetimeFigureOut">
               <a:rPr lang="en-GB" smtClean="0"/>
-              <a:t>20/01/2023</a:t>
+              <a:t>31/01/2023</a:t>
             </a:fld>
             <a:endParaRPr lang="en-GB"/>
           </a:p>
@@ -2927,7 +2933,7 @@
           <a:p>
             <a:fld id="{BF29F057-5540-425C-9A2E-DD2639D75A35}" type="datetimeFigureOut">
               <a:rPr lang="en-GB" smtClean="0"/>
-              <a:t>20/01/2023</a:t>
+              <a:t>31/01/2023</a:t>
             </a:fld>
             <a:endParaRPr lang="en-GB"/>
           </a:p>
@@ -3344,217 +3350,12 @@
           <a:chExt cx="0" cy="0"/>
         </a:xfrm>
       </p:grpSpPr>
-      <p:sp>
-        <p:nvSpPr>
-          <p:cNvPr id="4" name="Rectangle: Rounded Corners 3">
-            <a:extLst>
-              <a:ext uri="{FF2B5EF4-FFF2-40B4-BE49-F238E27FC236}">
-                <a16:creationId xmlns:a16="http://schemas.microsoft.com/office/drawing/2014/main" id="{9566EBEC-7F21-9F8F-E4CD-2EBECF092ABD}"/>
-              </a:ext>
-            </a:extLst>
-          </p:cNvPr>
-          <p:cNvSpPr/>
-          <p:nvPr/>
-        </p:nvSpPr>
-        <p:spPr>
-          <a:xfrm>
-            <a:off x="1527142" y="1404594"/>
-            <a:ext cx="2479250" cy="650449"/>
-          </a:xfrm>
-          <a:prstGeom prst="roundRect">
-            <a:avLst/>
-          </a:prstGeom>
-          <a:noFill/>
-          <a:ln>
-            <a:noFill/>
-          </a:ln>
-        </p:spPr>
-        <p:style>
-          <a:lnRef idx="2">
-            <a:schemeClr val="accent6">
-              <a:shade val="50000"/>
-            </a:schemeClr>
-          </a:lnRef>
-          <a:fillRef idx="1">
-            <a:schemeClr val="accent6"/>
-          </a:fillRef>
-          <a:effectRef idx="0">
-            <a:schemeClr val="accent6"/>
-          </a:effectRef>
-          <a:fontRef idx="minor">
-            <a:schemeClr val="lt1"/>
-          </a:fontRef>
-        </p:style>
-        <p:txBody>
-          <a:bodyPr rtlCol="0" anchor="ctr"/>
-          <a:lstStyle/>
-          <a:p>
-            <a:pPr algn="ctr"/>
-            <a:r>
-              <a:rPr lang="en-GB" dirty="0">
-                <a:solidFill>
-                  <a:schemeClr val="tx1"/>
-                </a:solidFill>
-              </a:rPr>
-              <a:t>Import csv</a:t>
-            </a:r>
-          </a:p>
-        </p:txBody>
-      </p:sp>
-      <p:sp>
-        <p:nvSpPr>
-          <p:cNvPr id="5" name="Rectangle: Rounded Corners 4">
-            <a:extLst>
-              <a:ext uri="{FF2B5EF4-FFF2-40B4-BE49-F238E27FC236}">
-                <a16:creationId xmlns:a16="http://schemas.microsoft.com/office/drawing/2014/main" id="{B2A012D7-9E6A-8CFF-AB7A-CA7AADD66F9B}"/>
-              </a:ext>
-            </a:extLst>
-          </p:cNvPr>
-          <p:cNvSpPr/>
-          <p:nvPr/>
-        </p:nvSpPr>
-        <p:spPr>
-          <a:xfrm>
-            <a:off x="1018095" y="216816"/>
-            <a:ext cx="8814062" cy="4242062"/>
-          </a:xfrm>
-          <a:prstGeom prst="roundRect">
-            <a:avLst/>
-          </a:prstGeom>
-          <a:noFill/>
-        </p:spPr>
-        <p:style>
-          <a:lnRef idx="2">
-            <a:schemeClr val="dk1"/>
-          </a:lnRef>
-          <a:fillRef idx="1">
-            <a:schemeClr val="lt1"/>
-          </a:fillRef>
-          <a:effectRef idx="0">
-            <a:schemeClr val="dk1"/>
-          </a:effectRef>
-          <a:fontRef idx="minor">
-            <a:schemeClr val="dk1"/>
-          </a:fontRef>
-        </p:style>
-        <p:txBody>
-          <a:bodyPr rtlCol="0" anchor="ctr"/>
-          <a:lstStyle/>
-          <a:p>
-            <a:pPr algn="ctr"/>
-            <a:endParaRPr lang="en-GB"/>
-          </a:p>
-        </p:txBody>
-      </p:sp>
-      <p:sp>
-        <p:nvSpPr>
-          <p:cNvPr id="6" name="TextBox 5">
-            <a:extLst>
-              <a:ext uri="{FF2B5EF4-FFF2-40B4-BE49-F238E27FC236}">
-                <a16:creationId xmlns:a16="http://schemas.microsoft.com/office/drawing/2014/main" id="{B3052262-AE79-4B4C-2110-ACC8B76662C1}"/>
-              </a:ext>
-            </a:extLst>
-          </p:cNvPr>
-          <p:cNvSpPr txBox="1"/>
-          <p:nvPr/>
-        </p:nvSpPr>
-        <p:spPr>
-          <a:xfrm>
-            <a:off x="4242062" y="399796"/>
-            <a:ext cx="2103268" cy="646331"/>
-          </a:xfrm>
-          <a:prstGeom prst="rect">
-            <a:avLst/>
-          </a:prstGeom>
-          <a:noFill/>
-        </p:spPr>
-        <p:txBody>
-          <a:bodyPr wrap="none" rtlCol="0">
-            <a:spAutoFit/>
-          </a:bodyPr>
-          <a:lstStyle/>
-          <a:p>
-            <a:r>
-              <a:rPr lang="en-GB" dirty="0"/>
-              <a:t>Welcome to </a:t>
-            </a:r>
-            <a:r>
-              <a:rPr lang="en-GB" dirty="0" err="1"/>
-              <a:t>GeoCAT</a:t>
-            </a:r>
-            <a:endParaRPr lang="en-GB" dirty="0"/>
-          </a:p>
-          <a:p>
-            <a:r>
-              <a:rPr lang="en-GB" dirty="0"/>
-              <a:t>Select option below</a:t>
-            </a:r>
-          </a:p>
-        </p:txBody>
-      </p:sp>
-      <p:sp>
-        <p:nvSpPr>
-          <p:cNvPr id="8" name="Rectangle: Rounded Corners 7">
-            <a:extLst>
-              <a:ext uri="{FF2B5EF4-FFF2-40B4-BE49-F238E27FC236}">
-                <a16:creationId xmlns:a16="http://schemas.microsoft.com/office/drawing/2014/main" id="{F451FE64-01D6-4154-8083-59F884052A1A}"/>
-              </a:ext>
-            </a:extLst>
-          </p:cNvPr>
-          <p:cNvSpPr/>
-          <p:nvPr/>
-        </p:nvSpPr>
-        <p:spPr>
-          <a:xfrm>
-            <a:off x="6242116" y="1404594"/>
-            <a:ext cx="2479250" cy="650449"/>
-          </a:xfrm>
-          <a:prstGeom prst="roundRect">
-            <a:avLst/>
-          </a:prstGeom>
-          <a:noFill/>
-          <a:ln>
-            <a:noFill/>
-          </a:ln>
-        </p:spPr>
-        <p:style>
-          <a:lnRef idx="2">
-            <a:schemeClr val="accent6">
-              <a:shade val="50000"/>
-            </a:schemeClr>
-          </a:lnRef>
-          <a:fillRef idx="1">
-            <a:schemeClr val="accent6"/>
-          </a:fillRef>
-          <a:effectRef idx="0">
-            <a:schemeClr val="accent6"/>
-          </a:effectRef>
-          <a:fontRef idx="minor">
-            <a:schemeClr val="lt1"/>
-          </a:fontRef>
-        </p:style>
-        <p:txBody>
-          <a:bodyPr rtlCol="0" anchor="ctr"/>
-          <a:lstStyle/>
-          <a:p>
-            <a:pPr algn="ctr"/>
-            <a:r>
-              <a:rPr lang="en-GB" dirty="0">
-                <a:solidFill>
-                  <a:schemeClr val="tx1"/>
-                </a:solidFill>
-              </a:rPr>
-              <a:t>Query GBIF</a:t>
-            </a:r>
-          </a:p>
-        </p:txBody>
-      </p:sp>
       <p:pic>
         <p:nvPicPr>
-          <p:cNvPr id="10" name="Picture 9">
-            <a:extLst>
-              <a:ext uri="{FF2B5EF4-FFF2-40B4-BE49-F238E27FC236}">
-                <a16:creationId xmlns:a16="http://schemas.microsoft.com/office/drawing/2014/main" id="{8C3CCC68-1604-8D09-780D-BC2F7938E5D0}"/>
+          <p:cNvPr id="23" name="Picture 22">
+            <a:extLst>
+              <a:ext uri="{FF2B5EF4-FFF2-40B4-BE49-F238E27FC236}">
+                <a16:creationId xmlns:a16="http://schemas.microsoft.com/office/drawing/2014/main" id="{70482C9E-6326-9097-B894-E34A017BC206}"/>
               </a:ext>
             </a:extLst>
           </p:cNvPr>
@@ -3571,267 +3372,89 @@
         </p:blipFill>
         <p:spPr>
           <a:xfrm>
-            <a:off x="1527142" y="2375778"/>
-            <a:ext cx="3751906" cy="1008916"/>
+            <a:off x="0" y="245783"/>
+            <a:ext cx="12192000" cy="5593435"/>
           </a:xfrm>
           <a:prstGeom prst="rect">
             <a:avLst/>
           </a:prstGeom>
         </p:spPr>
       </p:pic>
-      <p:pic>
-        <p:nvPicPr>
-          <p:cNvPr id="12" name="Picture 11">
-            <a:extLst>
-              <a:ext uri="{FF2B5EF4-FFF2-40B4-BE49-F238E27FC236}">
-                <a16:creationId xmlns:a16="http://schemas.microsoft.com/office/drawing/2014/main" id="{2C951723-F7A1-3055-6857-F6383C62D6BA}"/>
-              </a:ext>
-            </a:extLst>
-          </p:cNvPr>
-          <p:cNvPicPr>
-            <a:picLocks noChangeAspect="1"/>
-          </p:cNvPicPr>
+      <p:sp>
+        <p:nvSpPr>
+          <p:cNvPr id="11" name="Rectangle 10">
+            <a:extLst>
+              <a:ext uri="{FF2B5EF4-FFF2-40B4-BE49-F238E27FC236}">
+                <a16:creationId xmlns:a16="http://schemas.microsoft.com/office/drawing/2014/main" id="{5C60DDC2-2E1E-D5E0-B2A1-C114CA3A0144}"/>
+              </a:ext>
+            </a:extLst>
+          </p:cNvPr>
+          <p:cNvSpPr/>
           <p:nvPr/>
-        </p:nvPicPr>
-        <p:blipFill>
-          <a:blip r:embed="rId3"/>
-          <a:stretch>
-            <a:fillRect/>
-          </a:stretch>
-        </p:blipFill>
+        </p:nvSpPr>
         <p:spPr>
           <a:xfrm>
-            <a:off x="5858012" y="2233906"/>
-            <a:ext cx="2965478" cy="1235616"/>
+            <a:off x="580201" y="4602051"/>
+            <a:ext cx="4086067" cy="1167153"/>
           </a:xfrm>
           <a:prstGeom prst="rect">
             <a:avLst/>
           </a:prstGeom>
         </p:spPr>
-      </p:pic>
-      <p:sp>
-        <p:nvSpPr>
-          <p:cNvPr id="13" name="Rectangle: Rounded Corners 12">
-            <a:extLst>
-              <a:ext uri="{FF2B5EF4-FFF2-40B4-BE49-F238E27FC236}">
-                <a16:creationId xmlns:a16="http://schemas.microsoft.com/office/drawing/2014/main" id="{E82E9032-3A52-D417-AE1E-11501CB389EF}"/>
-              </a:ext>
-            </a:extLst>
-          </p:cNvPr>
-          <p:cNvSpPr/>
-          <p:nvPr/>
-        </p:nvSpPr>
-        <p:spPr>
-          <a:xfrm>
-            <a:off x="1198776" y="4939329"/>
-            <a:ext cx="3684309" cy="1678511"/>
-          </a:xfrm>
-          <a:prstGeom prst="roundRect">
-            <a:avLst/>
-          </a:prstGeom>
-          <a:noFill/>
-        </p:spPr>
         <p:style>
           <a:lnRef idx="2">
-            <a:schemeClr val="dk1"/>
+            <a:schemeClr val="accent1">
+              <a:shade val="50000"/>
+            </a:schemeClr>
           </a:lnRef>
           <a:fillRef idx="1">
-            <a:schemeClr val="lt1"/>
-          </a:fillRef>
-          <a:effectRef idx="0">
-            <a:schemeClr val="dk1"/>
-          </a:effectRef>
-          <a:fontRef idx="minor">
-            <a:schemeClr val="dk1"/>
-          </a:fontRef>
-        </p:style>
-        <p:txBody>
-          <a:bodyPr rtlCol="0" anchor="ctr"/>
-          <a:lstStyle/>
-          <a:p>
-            <a:pPr algn="ctr"/>
-            <a:endParaRPr lang="en-GB"/>
-          </a:p>
-        </p:txBody>
-      </p:sp>
-      <p:sp>
-        <p:nvSpPr>
-          <p:cNvPr id="14" name="TextBox 13">
-            <a:extLst>
-              <a:ext uri="{FF2B5EF4-FFF2-40B4-BE49-F238E27FC236}">
-                <a16:creationId xmlns:a16="http://schemas.microsoft.com/office/drawing/2014/main" id="{EAA2E52D-FAFE-6236-1940-1A3B8DC40A74}"/>
-              </a:ext>
-            </a:extLst>
-          </p:cNvPr>
-          <p:cNvSpPr txBox="1"/>
-          <p:nvPr/>
-        </p:nvSpPr>
-        <p:spPr>
-          <a:xfrm>
-            <a:off x="1772479" y="5323490"/>
-            <a:ext cx="2403595" cy="646331"/>
-          </a:xfrm>
-          <a:prstGeom prst="rect">
-            <a:avLst/>
-          </a:prstGeom>
-          <a:noFill/>
-        </p:spPr>
-        <p:txBody>
-          <a:bodyPr wrap="square" rtlCol="0">
-            <a:spAutoFit/>
-          </a:bodyPr>
-          <a:lstStyle/>
-          <a:p>
-            <a:r>
-              <a:rPr lang="en-GB" dirty="0"/>
-              <a:t>Analysis page with CSV loaded on map</a:t>
-            </a:r>
-          </a:p>
-        </p:txBody>
-      </p:sp>
-      <p:sp>
-        <p:nvSpPr>
-          <p:cNvPr id="15" name="Rectangle: Rounded Corners 14">
-            <a:extLst>
-              <a:ext uri="{FF2B5EF4-FFF2-40B4-BE49-F238E27FC236}">
-                <a16:creationId xmlns:a16="http://schemas.microsoft.com/office/drawing/2014/main" id="{12CABA0E-9EBF-29B9-6216-D5D73638B75C}"/>
-              </a:ext>
-            </a:extLst>
-          </p:cNvPr>
-          <p:cNvSpPr/>
-          <p:nvPr/>
-        </p:nvSpPr>
-        <p:spPr>
-          <a:xfrm>
-            <a:off x="6147848" y="4817345"/>
-            <a:ext cx="3684309" cy="1678511"/>
-          </a:xfrm>
-          <a:prstGeom prst="roundRect">
-            <a:avLst/>
-          </a:prstGeom>
-          <a:noFill/>
-        </p:spPr>
-        <p:style>
-          <a:lnRef idx="2">
-            <a:schemeClr val="dk1"/>
-          </a:lnRef>
-          <a:fillRef idx="1">
-            <a:schemeClr val="lt1"/>
-          </a:fillRef>
-          <a:effectRef idx="0">
-            <a:schemeClr val="dk1"/>
-          </a:effectRef>
-          <a:fontRef idx="minor">
-            <a:schemeClr val="dk1"/>
-          </a:fontRef>
-        </p:style>
-        <p:txBody>
-          <a:bodyPr rtlCol="0" anchor="ctr"/>
-          <a:lstStyle/>
-          <a:p>
-            <a:pPr algn="ctr"/>
-            <a:endParaRPr lang="en-GB"/>
-          </a:p>
-        </p:txBody>
-      </p:sp>
-      <p:sp>
-        <p:nvSpPr>
-          <p:cNvPr id="16" name="TextBox 15">
-            <a:extLst>
-              <a:ext uri="{FF2B5EF4-FFF2-40B4-BE49-F238E27FC236}">
-                <a16:creationId xmlns:a16="http://schemas.microsoft.com/office/drawing/2014/main" id="{D522AF44-562C-AE0D-D0BB-47441BE85FAE}"/>
-              </a:ext>
-            </a:extLst>
-          </p:cNvPr>
-          <p:cNvSpPr txBox="1"/>
-          <p:nvPr/>
-        </p:nvSpPr>
-        <p:spPr>
-          <a:xfrm>
-            <a:off x="6721551" y="5201506"/>
-            <a:ext cx="2403595" cy="646331"/>
-          </a:xfrm>
-          <a:prstGeom prst="rect">
-            <a:avLst/>
-          </a:prstGeom>
-          <a:noFill/>
-        </p:spPr>
-        <p:txBody>
-          <a:bodyPr wrap="square" rtlCol="0">
-            <a:spAutoFit/>
-          </a:bodyPr>
-          <a:lstStyle/>
-          <a:p>
-            <a:r>
-              <a:rPr lang="en-GB" dirty="0"/>
-              <a:t>Analysis page with GBIF loaded on map</a:t>
-            </a:r>
-          </a:p>
-        </p:txBody>
-      </p:sp>
-      <p:cxnSp>
-        <p:nvCxnSpPr>
-          <p:cNvPr id="18" name="Straight Arrow Connector 17">
-            <a:extLst>
-              <a:ext uri="{FF2B5EF4-FFF2-40B4-BE49-F238E27FC236}">
-                <a16:creationId xmlns:a16="http://schemas.microsoft.com/office/drawing/2014/main" id="{A195FFFE-CBE4-1DE5-400F-008FD8D13D77}"/>
-              </a:ext>
-            </a:extLst>
-          </p:cNvPr>
-          <p:cNvCxnSpPr>
-            <a:cxnSpLocks/>
-            <a:stCxn id="10" idx="2"/>
-            <a:endCxn id="13" idx="0"/>
-          </p:cNvCxnSpPr>
-          <p:nvPr/>
-        </p:nvCxnSpPr>
-        <p:spPr>
-          <a:xfrm flipH="1">
-            <a:off x="3040931" y="3384694"/>
-            <a:ext cx="362164" cy="1554635"/>
-          </a:xfrm>
-          <a:prstGeom prst="straightConnector1">
-            <a:avLst/>
-          </a:prstGeom>
-          <a:ln>
-            <a:tailEnd type="triangle"/>
-          </a:ln>
-        </p:spPr>
-        <p:style>
-          <a:lnRef idx="1">
-            <a:schemeClr val="accent1"/>
-          </a:lnRef>
-          <a:fillRef idx="0">
             <a:schemeClr val="accent1"/>
           </a:fillRef>
           <a:effectRef idx="0">
             <a:schemeClr val="accent1"/>
           </a:effectRef>
           <a:fontRef idx="minor">
-            <a:schemeClr val="tx1"/>
+            <a:schemeClr val="lt1"/>
           </a:fontRef>
         </p:style>
-      </p:cxnSp>
+        <p:txBody>
+          <a:bodyPr rtlCol="0" anchor="ctr"/>
+          <a:lstStyle/>
+          <a:p>
+            <a:pPr algn="ctr"/>
+            <a:r>
+              <a:rPr lang="en-GB" dirty="0"/>
+              <a:t>CSV file could be just ‘id’, ‘</a:t>
+            </a:r>
+            <a:r>
+              <a:rPr lang="en-GB" dirty="0" err="1"/>
+              <a:t>lat</a:t>
+            </a:r>
+            <a:r>
+              <a:rPr lang="en-GB" dirty="0"/>
+              <a:t>’ and ‘long’, but user could have other fields – how do we handle other fields? Standard set for validation?</a:t>
+            </a:r>
+          </a:p>
+        </p:txBody>
+      </p:sp>
       <p:cxnSp>
         <p:nvCxnSpPr>
-          <p:cNvPr id="19" name="Straight Arrow Connector 18">
-            <a:extLst>
-              <a:ext uri="{FF2B5EF4-FFF2-40B4-BE49-F238E27FC236}">
-                <a16:creationId xmlns:a16="http://schemas.microsoft.com/office/drawing/2014/main" id="{BF7E2E89-A0DF-DEFB-F210-ED6D5979E3D3}"/>
+          <p:cNvPr id="20" name="Straight Arrow Connector 19">
+            <a:extLst>
+              <a:ext uri="{FF2B5EF4-FFF2-40B4-BE49-F238E27FC236}">
+                <a16:creationId xmlns:a16="http://schemas.microsoft.com/office/drawing/2014/main" id="{20101119-A886-6171-04BF-997BE27F4EDF}"/>
               </a:ext>
             </a:extLst>
           </p:cNvPr>
           <p:cNvCxnSpPr>
             <a:cxnSpLocks/>
-            <a:stCxn id="12" idx="2"/>
-            <a:endCxn id="15" idx="0"/>
           </p:cNvCxnSpPr>
           <p:nvPr/>
         </p:nvCxnSpPr>
         <p:spPr>
-          <a:xfrm>
-            <a:off x="7340751" y="3469522"/>
-            <a:ext cx="649252" cy="1347823"/>
+          <a:xfrm flipH="1" flipV="1">
+            <a:off x="2036190" y="2460396"/>
+            <a:ext cx="375540" cy="2134464"/>
           </a:xfrm>
           <a:prstGeom prst="straightConnector1">
             <a:avLst/>
@@ -3885,181 +3508,12 @@
           <a:chExt cx="0" cy="0"/>
         </a:xfrm>
       </p:grpSpPr>
-      <p:sp>
-        <p:nvSpPr>
-          <p:cNvPr id="13" name="Rectangle: Rounded Corners 12">
-            <a:extLst>
-              <a:ext uri="{FF2B5EF4-FFF2-40B4-BE49-F238E27FC236}">
-                <a16:creationId xmlns:a16="http://schemas.microsoft.com/office/drawing/2014/main" id="{E82E9032-3A52-D417-AE1E-11501CB389EF}"/>
-              </a:ext>
-            </a:extLst>
-          </p:cNvPr>
-          <p:cNvSpPr/>
-          <p:nvPr/>
-        </p:nvSpPr>
-        <p:spPr>
-          <a:xfrm>
-            <a:off x="1123361" y="888179"/>
-            <a:ext cx="3684309" cy="1678511"/>
-          </a:xfrm>
-          <a:prstGeom prst="roundRect">
-            <a:avLst/>
-          </a:prstGeom>
-          <a:noFill/>
-        </p:spPr>
-        <p:style>
-          <a:lnRef idx="2">
-            <a:schemeClr val="dk1"/>
-          </a:lnRef>
-          <a:fillRef idx="1">
-            <a:schemeClr val="lt1"/>
-          </a:fillRef>
-          <a:effectRef idx="0">
-            <a:schemeClr val="dk1"/>
-          </a:effectRef>
-          <a:fontRef idx="minor">
-            <a:schemeClr val="dk1"/>
-          </a:fontRef>
-        </p:style>
-        <p:txBody>
-          <a:bodyPr rtlCol="0" anchor="ctr"/>
-          <a:lstStyle/>
-          <a:p>
-            <a:pPr algn="ctr"/>
-            <a:endParaRPr lang="en-GB"/>
-          </a:p>
-        </p:txBody>
-      </p:sp>
-      <p:sp>
-        <p:nvSpPr>
-          <p:cNvPr id="14" name="TextBox 13">
-            <a:extLst>
-              <a:ext uri="{FF2B5EF4-FFF2-40B4-BE49-F238E27FC236}">
-                <a16:creationId xmlns:a16="http://schemas.microsoft.com/office/drawing/2014/main" id="{EAA2E52D-FAFE-6236-1940-1A3B8DC40A74}"/>
-              </a:ext>
-            </a:extLst>
-          </p:cNvPr>
-          <p:cNvSpPr txBox="1"/>
-          <p:nvPr/>
-        </p:nvSpPr>
-        <p:spPr>
-          <a:xfrm>
-            <a:off x="1687637" y="1307672"/>
-            <a:ext cx="2403595" cy="646331"/>
-          </a:xfrm>
-          <a:prstGeom prst="rect">
-            <a:avLst/>
-          </a:prstGeom>
-          <a:noFill/>
-        </p:spPr>
-        <p:txBody>
-          <a:bodyPr wrap="square" rtlCol="0">
-            <a:spAutoFit/>
-          </a:bodyPr>
-          <a:lstStyle/>
-          <a:p>
-            <a:r>
-              <a:rPr lang="en-GB" dirty="0"/>
-              <a:t>Analysis page with CSV loaded on map</a:t>
-            </a:r>
-          </a:p>
-        </p:txBody>
-      </p:sp>
-      <p:sp>
-        <p:nvSpPr>
-          <p:cNvPr id="15" name="Rectangle: Rounded Corners 14">
-            <a:extLst>
-              <a:ext uri="{FF2B5EF4-FFF2-40B4-BE49-F238E27FC236}">
-                <a16:creationId xmlns:a16="http://schemas.microsoft.com/office/drawing/2014/main" id="{12CABA0E-9EBF-29B9-6216-D5D73638B75C}"/>
-              </a:ext>
-            </a:extLst>
-          </p:cNvPr>
-          <p:cNvSpPr/>
-          <p:nvPr/>
-        </p:nvSpPr>
-        <p:spPr>
-          <a:xfrm>
-            <a:off x="6251543" y="735140"/>
-            <a:ext cx="3684309" cy="1754326"/>
-          </a:xfrm>
-          <a:prstGeom prst="roundRect">
-            <a:avLst/>
-          </a:prstGeom>
-          <a:noFill/>
-        </p:spPr>
-        <p:style>
-          <a:lnRef idx="2">
-            <a:schemeClr val="dk1"/>
-          </a:lnRef>
-          <a:fillRef idx="1">
-            <a:schemeClr val="lt1"/>
-          </a:fillRef>
-          <a:effectRef idx="0">
-            <a:schemeClr val="dk1"/>
-          </a:effectRef>
-          <a:fontRef idx="minor">
-            <a:schemeClr val="dk1"/>
-          </a:fontRef>
-        </p:style>
-        <p:txBody>
-          <a:bodyPr rtlCol="0" anchor="ctr"/>
-          <a:lstStyle/>
-          <a:p>
-            <a:pPr algn="ctr"/>
-            <a:endParaRPr lang="en-GB"/>
-          </a:p>
-        </p:txBody>
-      </p:sp>
-      <p:sp>
-        <p:nvSpPr>
-          <p:cNvPr id="16" name="TextBox 15">
-            <a:extLst>
-              <a:ext uri="{FF2B5EF4-FFF2-40B4-BE49-F238E27FC236}">
-                <a16:creationId xmlns:a16="http://schemas.microsoft.com/office/drawing/2014/main" id="{D522AF44-562C-AE0D-D0BB-47441BE85FAE}"/>
-              </a:ext>
-            </a:extLst>
-          </p:cNvPr>
-          <p:cNvSpPr txBox="1"/>
-          <p:nvPr/>
-        </p:nvSpPr>
-        <p:spPr>
-          <a:xfrm>
-            <a:off x="6825246" y="753674"/>
-            <a:ext cx="2403595" cy="1754326"/>
-          </a:xfrm>
-          <a:prstGeom prst="rect">
-            <a:avLst/>
-          </a:prstGeom>
-          <a:noFill/>
-        </p:spPr>
-        <p:txBody>
-          <a:bodyPr wrap="square" rtlCol="0">
-            <a:spAutoFit/>
-          </a:bodyPr>
-          <a:lstStyle/>
-          <a:p>
-            <a:r>
-              <a:rPr lang="en-GB" dirty="0"/>
-              <a:t>Analysis page with GBIF data loaded on map</a:t>
-            </a:r>
-          </a:p>
-          <a:p>
-            <a:endParaRPr lang="en-GB" dirty="0"/>
-          </a:p>
-          <a:p>
-            <a:r>
-              <a:rPr lang="en-GB" dirty="0"/>
-              <a:t>Keep simplified GBIF format so users can track back to source</a:t>
-            </a:r>
-          </a:p>
-        </p:txBody>
-      </p:sp>
       <p:pic>
         <p:nvPicPr>
-          <p:cNvPr id="3" name="Picture 2">
-            <a:extLst>
-              <a:ext uri="{FF2B5EF4-FFF2-40B4-BE49-F238E27FC236}">
-                <a16:creationId xmlns:a16="http://schemas.microsoft.com/office/drawing/2014/main" id="{C0BA7A21-CAE7-A67D-DEF5-40347E191238}"/>
+          <p:cNvPr id="4" name="Picture 3">
+            <a:extLst>
+              <a:ext uri="{FF2B5EF4-FFF2-40B4-BE49-F238E27FC236}">
+                <a16:creationId xmlns:a16="http://schemas.microsoft.com/office/drawing/2014/main" id="{5C6B723B-9169-78A3-CB7A-52DB2A1BA425}"/>
               </a:ext>
             </a:extLst>
           </p:cNvPr>
@@ -4076,226 +3530,30 @@
         </p:blipFill>
         <p:spPr>
           <a:xfrm>
-            <a:off x="2011100" y="2908562"/>
-            <a:ext cx="1514475" cy="381000"/>
+            <a:off x="0" y="511710"/>
+            <a:ext cx="12192000" cy="5834580"/>
           </a:xfrm>
           <a:prstGeom prst="rect">
             <a:avLst/>
           </a:prstGeom>
         </p:spPr>
       </p:pic>
-      <p:pic>
-        <p:nvPicPr>
-          <p:cNvPr id="9" name="Picture 8">
-            <a:extLst>
-              <a:ext uri="{FF2B5EF4-FFF2-40B4-BE49-F238E27FC236}">
-                <a16:creationId xmlns:a16="http://schemas.microsoft.com/office/drawing/2014/main" id="{E1919844-3CBF-48BA-F741-23A759BDC8AF}"/>
-              </a:ext>
-            </a:extLst>
-          </p:cNvPr>
-          <p:cNvPicPr>
-            <a:picLocks noChangeAspect="1"/>
-          </p:cNvPicPr>
+      <p:sp>
+        <p:nvSpPr>
+          <p:cNvPr id="11" name="Rectangle 10">
+            <a:extLst>
+              <a:ext uri="{FF2B5EF4-FFF2-40B4-BE49-F238E27FC236}">
+                <a16:creationId xmlns:a16="http://schemas.microsoft.com/office/drawing/2014/main" id="{5C60DDC2-2E1E-D5E0-B2A1-C114CA3A0144}"/>
+              </a:ext>
+            </a:extLst>
+          </p:cNvPr>
+          <p:cNvSpPr/>
           <p:nvPr/>
-        </p:nvPicPr>
-        <p:blipFill>
-          <a:blip r:embed="rId3"/>
-          <a:stretch>
-            <a:fillRect/>
-          </a:stretch>
-        </p:blipFill>
+        </p:nvSpPr>
         <p:spPr>
           <a:xfrm>
-            <a:off x="1779652" y="3429000"/>
-            <a:ext cx="2524125" cy="571500"/>
-          </a:xfrm>
-          <a:prstGeom prst="rect">
-            <a:avLst/>
-          </a:prstGeom>
-        </p:spPr>
-      </p:pic>
-      <p:sp>
-        <p:nvSpPr>
-          <p:cNvPr id="11" name="Rectangle: Rounded Corners 10">
-            <a:extLst>
-              <a:ext uri="{FF2B5EF4-FFF2-40B4-BE49-F238E27FC236}">
-                <a16:creationId xmlns:a16="http://schemas.microsoft.com/office/drawing/2014/main" id="{DE2D1C37-828F-52E0-DE66-DC433DB5EC73}"/>
-              </a:ext>
-            </a:extLst>
-          </p:cNvPr>
-          <p:cNvSpPr/>
-          <p:nvPr/>
-        </p:nvSpPr>
-        <p:spPr>
-          <a:xfrm>
-            <a:off x="608225" y="5786649"/>
-            <a:ext cx="1757854" cy="646331"/>
-          </a:xfrm>
-          <a:prstGeom prst="roundRect">
-            <a:avLst/>
-          </a:prstGeom>
-          <a:noFill/>
-        </p:spPr>
-        <p:style>
-          <a:lnRef idx="2">
-            <a:schemeClr val="dk1"/>
-          </a:lnRef>
-          <a:fillRef idx="1">
-            <a:schemeClr val="lt1"/>
-          </a:fillRef>
-          <a:effectRef idx="0">
-            <a:schemeClr val="dk1"/>
-          </a:effectRef>
-          <a:fontRef idx="minor">
-            <a:schemeClr val="dk1"/>
-          </a:fontRef>
-        </p:style>
-        <p:txBody>
-          <a:bodyPr rtlCol="0" anchor="ctr"/>
-          <a:lstStyle/>
-          <a:p>
-            <a:pPr algn="ctr"/>
-            <a:endParaRPr lang="en-GB"/>
-          </a:p>
-        </p:txBody>
-      </p:sp>
-      <p:sp>
-        <p:nvSpPr>
-          <p:cNvPr id="17" name="TextBox 16">
-            <a:extLst>
-              <a:ext uri="{FF2B5EF4-FFF2-40B4-BE49-F238E27FC236}">
-                <a16:creationId xmlns:a16="http://schemas.microsoft.com/office/drawing/2014/main" id="{802C707F-BE42-36A7-3613-27E640DBDD6F}"/>
-              </a:ext>
-            </a:extLst>
-          </p:cNvPr>
-          <p:cNvSpPr txBox="1"/>
-          <p:nvPr/>
-        </p:nvSpPr>
-        <p:spPr>
-          <a:xfrm>
-            <a:off x="676496" y="5738346"/>
-            <a:ext cx="1757854" cy="646331"/>
-          </a:xfrm>
-          <a:prstGeom prst="rect">
-            <a:avLst/>
-          </a:prstGeom>
-          <a:noFill/>
-        </p:spPr>
-        <p:txBody>
-          <a:bodyPr wrap="square" rtlCol="0">
-            <a:spAutoFit/>
-          </a:bodyPr>
-          <a:lstStyle/>
-          <a:p>
-            <a:r>
-              <a:rPr lang="en-GB" dirty="0"/>
-              <a:t>Download IUCN points file</a:t>
-            </a:r>
-          </a:p>
-        </p:txBody>
-      </p:sp>
-      <p:sp>
-        <p:nvSpPr>
-          <p:cNvPr id="20" name="Rectangle: Rounded Corners 19">
-            <a:extLst>
-              <a:ext uri="{FF2B5EF4-FFF2-40B4-BE49-F238E27FC236}">
-                <a16:creationId xmlns:a16="http://schemas.microsoft.com/office/drawing/2014/main" id="{62F75383-5D42-6EB0-05C5-6623F176B931}"/>
-              </a:ext>
-            </a:extLst>
-          </p:cNvPr>
-          <p:cNvSpPr/>
-          <p:nvPr/>
-        </p:nvSpPr>
-        <p:spPr>
-          <a:xfrm>
-            <a:off x="8839396" y="2966396"/>
-            <a:ext cx="1757854" cy="923330"/>
-          </a:xfrm>
-          <a:prstGeom prst="roundRect">
-            <a:avLst/>
-          </a:prstGeom>
-          <a:noFill/>
-        </p:spPr>
-        <p:style>
-          <a:lnRef idx="2">
-            <a:schemeClr val="dk1"/>
-          </a:lnRef>
-          <a:fillRef idx="1">
-            <a:schemeClr val="lt1"/>
-          </a:fillRef>
-          <a:effectRef idx="0">
-            <a:schemeClr val="dk1"/>
-          </a:effectRef>
-          <a:fontRef idx="minor">
-            <a:schemeClr val="dk1"/>
-          </a:fontRef>
-        </p:style>
-        <p:txBody>
-          <a:bodyPr rtlCol="0" anchor="ctr"/>
-          <a:lstStyle/>
-          <a:p>
-            <a:pPr algn="ctr"/>
-            <a:endParaRPr lang="en-GB"/>
-          </a:p>
-        </p:txBody>
-      </p:sp>
-      <p:sp>
-        <p:nvSpPr>
-          <p:cNvPr id="21" name="TextBox 20">
-            <a:extLst>
-              <a:ext uri="{FF2B5EF4-FFF2-40B4-BE49-F238E27FC236}">
-                <a16:creationId xmlns:a16="http://schemas.microsoft.com/office/drawing/2014/main" id="{657F2CD6-B53F-8C4A-8004-3FD07DE31389}"/>
-              </a:ext>
-            </a:extLst>
-          </p:cNvPr>
-          <p:cNvSpPr txBox="1"/>
-          <p:nvPr/>
-        </p:nvSpPr>
-        <p:spPr>
-          <a:xfrm>
-            <a:off x="8935605" y="2966396"/>
-            <a:ext cx="1757854" cy="923330"/>
-          </a:xfrm>
-          <a:prstGeom prst="rect">
-            <a:avLst/>
-          </a:prstGeom>
-          <a:noFill/>
-        </p:spPr>
-        <p:txBody>
-          <a:bodyPr wrap="square" rtlCol="0">
-            <a:spAutoFit/>
-          </a:bodyPr>
-          <a:lstStyle/>
-          <a:p>
-            <a:r>
-              <a:rPr lang="en-GB" dirty="0"/>
-              <a:t>Button:</a:t>
-            </a:r>
-          </a:p>
-          <a:p>
-            <a:r>
-              <a:rPr lang="en-GB" dirty="0"/>
-              <a:t>Download IUCN points file</a:t>
-            </a:r>
-          </a:p>
-        </p:txBody>
-      </p:sp>
-      <p:sp>
-        <p:nvSpPr>
-          <p:cNvPr id="22" name="Rectangle 21">
-            <a:extLst>
-              <a:ext uri="{FF2B5EF4-FFF2-40B4-BE49-F238E27FC236}">
-                <a16:creationId xmlns:a16="http://schemas.microsoft.com/office/drawing/2014/main" id="{0C82CD61-F06C-1EBB-3DF5-5BDA1438651D}"/>
-              </a:ext>
-            </a:extLst>
-          </p:cNvPr>
-          <p:cNvSpPr/>
-          <p:nvPr/>
-        </p:nvSpPr>
-        <p:spPr>
-          <a:xfrm>
-            <a:off x="9002598" y="4364610"/>
-            <a:ext cx="1594652" cy="697584"/>
+            <a:off x="627335" y="5092245"/>
+            <a:ext cx="3723573" cy="507278"/>
           </a:xfrm>
           <a:prstGeom prst="rect">
             <a:avLst/>
@@ -4324,69 +3582,30 @@
             <a:pPr algn="ctr"/>
             <a:r>
               <a:rPr lang="en-GB" dirty="0"/>
-              <a:t>Convert GBIF to IUCN format</a:t>
-            </a:r>
-          </a:p>
-        </p:txBody>
-      </p:sp>
-      <p:pic>
-        <p:nvPicPr>
-          <p:cNvPr id="24" name="Graphic 23" descr="Document with solid fill">
-            <a:extLst>
-              <a:ext uri="{FF2B5EF4-FFF2-40B4-BE49-F238E27FC236}">
-                <a16:creationId xmlns:a16="http://schemas.microsoft.com/office/drawing/2014/main" id="{6994F8A4-0452-51EF-300D-019EDFB4929A}"/>
-              </a:ext>
-            </a:extLst>
-          </p:cNvPr>
-          <p:cNvPicPr>
-            <a:picLocks noChangeAspect="1"/>
-          </p:cNvPicPr>
-          <p:nvPr/>
-        </p:nvPicPr>
-        <p:blipFill>
-          <a:blip r:embed="rId4">
-            <a:extLst>
-              <a:ext uri="{28A0092B-C50C-407E-A947-70E740481C1C}">
-                <a14:useLocalDpi xmlns:a14="http://schemas.microsoft.com/office/drawing/2010/main" val="0"/>
-              </a:ext>
-              <a:ext uri="{96DAC541-7B7A-43D3-8B79-37D633B846F1}">
-                <asvg:svgBlip xmlns:asvg="http://schemas.microsoft.com/office/drawing/2016/SVG/main" r:embed="rId5"/>
-              </a:ext>
-            </a:extLst>
-          </a:blip>
-          <a:stretch>
-            <a:fillRect/>
-          </a:stretch>
-        </p:blipFill>
-        <p:spPr>
-          <a:xfrm>
-            <a:off x="9342724" y="5537078"/>
-            <a:ext cx="914400" cy="914400"/>
-          </a:xfrm>
-          <a:prstGeom prst="rect">
-            <a:avLst/>
-          </a:prstGeom>
-        </p:spPr>
-      </p:pic>
+              <a:t>Lat and long used to plot points.</a:t>
+            </a:r>
+          </a:p>
+        </p:txBody>
+      </p:sp>
       <p:cxnSp>
         <p:nvCxnSpPr>
-          <p:cNvPr id="26" name="Straight Arrow Connector 25">
-            <a:extLst>
-              <a:ext uri="{FF2B5EF4-FFF2-40B4-BE49-F238E27FC236}">
-                <a16:creationId xmlns:a16="http://schemas.microsoft.com/office/drawing/2014/main" id="{0037E467-A630-727D-9268-A3AB6E857144}"/>
+          <p:cNvPr id="20" name="Straight Arrow Connector 19">
+            <a:extLst>
+              <a:ext uri="{FF2B5EF4-FFF2-40B4-BE49-F238E27FC236}">
+                <a16:creationId xmlns:a16="http://schemas.microsoft.com/office/drawing/2014/main" id="{20101119-A886-6171-04BF-997BE27F4EDF}"/>
               </a:ext>
             </a:extLst>
           </p:cNvPr>
           <p:cNvCxnSpPr>
-            <a:stCxn id="22" idx="2"/>
-            <a:endCxn id="24" idx="0"/>
+            <a:cxnSpLocks/>
+            <a:stCxn id="11" idx="0"/>
           </p:cNvCxnSpPr>
           <p:nvPr/>
         </p:nvCxnSpPr>
         <p:spPr>
-          <a:xfrm>
-            <a:off x="9799924" y="5062194"/>
-            <a:ext cx="0" cy="474884"/>
+          <a:xfrm flipH="1" flipV="1">
+            <a:off x="1649691" y="2762054"/>
+            <a:ext cx="839431" cy="2330191"/>
           </a:xfrm>
           <a:prstGeom prst="straightConnector1">
             <a:avLst/>
@@ -4412,29 +3631,31 @@
       </p:cxnSp>
       <p:cxnSp>
         <p:nvCxnSpPr>
-          <p:cNvPr id="27" name="Straight Arrow Connector 26">
-            <a:extLst>
-              <a:ext uri="{FF2B5EF4-FFF2-40B4-BE49-F238E27FC236}">
-                <a16:creationId xmlns:a16="http://schemas.microsoft.com/office/drawing/2014/main" id="{F367AFBC-DCCD-78CB-1B79-9826802CD04E}"/>
+          <p:cNvPr id="8" name="Straight Arrow Connector 7">
+            <a:extLst>
+              <a:ext uri="{FF2B5EF4-FFF2-40B4-BE49-F238E27FC236}">
+                <a16:creationId xmlns:a16="http://schemas.microsoft.com/office/drawing/2014/main" id="{EFBED707-77ED-B629-3CFD-ADF9443000F9}"/>
               </a:ext>
             </a:extLst>
           </p:cNvPr>
           <p:cNvCxnSpPr>
             <a:cxnSpLocks/>
-            <a:stCxn id="21" idx="2"/>
-            <a:endCxn id="22" idx="0"/>
+            <a:stCxn id="12" idx="0"/>
           </p:cNvCxnSpPr>
           <p:nvPr/>
         </p:nvCxnSpPr>
         <p:spPr>
-          <a:xfrm flipH="1">
-            <a:off x="9799924" y="3889726"/>
-            <a:ext cx="14608" cy="474884"/>
+          <a:xfrm flipH="1" flipV="1">
+            <a:off x="6096000" y="3932907"/>
+            <a:ext cx="1244560" cy="1010079"/>
           </a:xfrm>
           <a:prstGeom prst="straightConnector1">
             <a:avLst/>
           </a:prstGeom>
-          <a:ln>
+          <a:ln w="28575">
+            <a:solidFill>
+              <a:schemeClr val="bg1"/>
+            </a:solidFill>
             <a:tailEnd type="triangle"/>
           </a:ln>
         </p:spPr>
@@ -4453,12 +3674,135 @@
           </a:fontRef>
         </p:style>
       </p:cxnSp>
+      <p:sp>
+        <p:nvSpPr>
+          <p:cNvPr id="12" name="Rectangle 11">
+            <a:extLst>
+              <a:ext uri="{FF2B5EF4-FFF2-40B4-BE49-F238E27FC236}">
+                <a16:creationId xmlns:a16="http://schemas.microsoft.com/office/drawing/2014/main" id="{D8CF3868-4A11-E3A8-F510-B14D4B8D7C24}"/>
+              </a:ext>
+            </a:extLst>
+          </p:cNvPr>
+          <p:cNvSpPr/>
+          <p:nvPr/>
+        </p:nvSpPr>
+        <p:spPr>
+          <a:xfrm>
+            <a:off x="5478773" y="4942986"/>
+            <a:ext cx="3723573" cy="1010079"/>
+          </a:xfrm>
+          <a:prstGeom prst="rect">
+            <a:avLst/>
+          </a:prstGeom>
+        </p:spPr>
+        <p:style>
+          <a:lnRef idx="2">
+            <a:schemeClr val="accent1">
+              <a:shade val="50000"/>
+            </a:schemeClr>
+          </a:lnRef>
+          <a:fillRef idx="1">
+            <a:schemeClr val="accent1"/>
+          </a:fillRef>
+          <a:effectRef idx="0">
+            <a:schemeClr val="accent1"/>
+          </a:effectRef>
+          <a:fontRef idx="minor">
+            <a:schemeClr val="lt1"/>
+          </a:fontRef>
+        </p:style>
+        <p:txBody>
+          <a:bodyPr rtlCol="0" anchor="ctr"/>
+          <a:lstStyle/>
+          <a:p>
+            <a:pPr algn="ctr"/>
+            <a:r>
+              <a:rPr lang="en-GB" dirty="0"/>
+              <a:t>Id used for label popup windows to help identify points you want to edit</a:t>
+            </a:r>
+          </a:p>
+        </p:txBody>
+      </p:sp>
+      <p:cxnSp>
+        <p:nvCxnSpPr>
+          <p:cNvPr id="17" name="Straight Arrow Connector 16">
+            <a:extLst>
+              <a:ext uri="{FF2B5EF4-FFF2-40B4-BE49-F238E27FC236}">
+                <a16:creationId xmlns:a16="http://schemas.microsoft.com/office/drawing/2014/main" id="{2E496A5C-0948-A3F2-575E-D9306493F331}"/>
+              </a:ext>
+            </a:extLst>
+          </p:cNvPr>
+          <p:cNvCxnSpPr>
+            <a:cxnSpLocks/>
+          </p:cNvCxnSpPr>
+          <p:nvPr/>
+        </p:nvCxnSpPr>
+        <p:spPr>
+          <a:xfrm flipV="1">
+            <a:off x="7340559" y="4053526"/>
+            <a:ext cx="1303820" cy="899065"/>
+          </a:xfrm>
+          <a:prstGeom prst="straightConnector1">
+            <a:avLst/>
+          </a:prstGeom>
+          <a:ln w="28575">
+            <a:solidFill>
+              <a:schemeClr val="bg1"/>
+            </a:solidFill>
+            <a:tailEnd type="triangle"/>
+          </a:ln>
+        </p:spPr>
+        <p:style>
+          <a:lnRef idx="1">
+            <a:schemeClr val="accent1"/>
+          </a:lnRef>
+          <a:fillRef idx="0">
+            <a:schemeClr val="accent1"/>
+          </a:fillRef>
+          <a:effectRef idx="0">
+            <a:schemeClr val="accent1"/>
+          </a:effectRef>
+          <a:fontRef idx="minor">
+            <a:schemeClr val="tx1"/>
+          </a:fontRef>
+        </p:style>
+      </p:cxnSp>
+    </p:spTree>
+    <p:extLst>
+      <p:ext uri="{BB962C8B-B14F-4D97-AF65-F5344CB8AC3E}">
+        <p14:creationId xmlns:p14="http://schemas.microsoft.com/office/powerpoint/2010/main" val="1580652810"/>
+      </p:ext>
+    </p:extLst>
+  </p:cSld>
+  <p:clrMapOvr>
+    <a:masterClrMapping/>
+  </p:clrMapOvr>
+</p:sld>
+</file>
+
+<file path=ppt/slides/slide3.xml><?xml version="1.0" encoding="utf-8"?>
+<p:sld xmlns:a="http://schemas.openxmlformats.org/drawingml/2006/main" xmlns:r="http://schemas.openxmlformats.org/officeDocument/2006/relationships" xmlns:p="http://schemas.openxmlformats.org/presentationml/2006/main">
+  <p:cSld>
+    <p:spTree>
+      <p:nvGrpSpPr>
+        <p:cNvPr id="1" name=""/>
+        <p:cNvGrpSpPr/>
+        <p:nvPr/>
+      </p:nvGrpSpPr>
+      <p:grpSpPr>
+        <a:xfrm>
+          <a:off x="0" y="0"/>
+          <a:ext cx="0" cy="0"/>
+          <a:chOff x="0" y="0"/>
+          <a:chExt cx="0" cy="0"/>
+        </a:xfrm>
+      </p:grpSpPr>
       <p:pic>
         <p:nvPicPr>
-          <p:cNvPr id="30" name="Picture 29">
-            <a:extLst>
-              <a:ext uri="{FF2B5EF4-FFF2-40B4-BE49-F238E27FC236}">
-                <a16:creationId xmlns:a16="http://schemas.microsoft.com/office/drawing/2014/main" id="{1AE12CB7-8780-9296-3B6E-EF54993E928A}"/>
+          <p:cNvPr id="3" name="Picture 2">
+            <a:extLst>
+              <a:ext uri="{FF2B5EF4-FFF2-40B4-BE49-F238E27FC236}">
+                <a16:creationId xmlns:a16="http://schemas.microsoft.com/office/drawing/2014/main" id="{C0BA7A21-CAE7-A67D-DEF5-40347E191238}"/>
               </a:ext>
             </a:extLst>
           </p:cNvPr>
@@ -4475,7 +3819,7 @@
         </p:blipFill>
         <p:spPr>
           <a:xfrm>
-            <a:off x="6162664" y="3083538"/>
+            <a:off x="2011100" y="2908562"/>
             <a:ext cx="1514475" cy="381000"/>
           </a:xfrm>
           <a:prstGeom prst="rect">
@@ -4485,10 +3829,10 @@
       </p:pic>
       <p:pic>
         <p:nvPicPr>
-          <p:cNvPr id="31" name="Picture 30">
-            <a:extLst>
-              <a:ext uri="{FF2B5EF4-FFF2-40B4-BE49-F238E27FC236}">
-                <a16:creationId xmlns:a16="http://schemas.microsoft.com/office/drawing/2014/main" id="{9CB93680-6A1E-D728-8169-228B92467B7D}"/>
+          <p:cNvPr id="9" name="Picture 8">
+            <a:extLst>
+              <a:ext uri="{FF2B5EF4-FFF2-40B4-BE49-F238E27FC236}">
+                <a16:creationId xmlns:a16="http://schemas.microsoft.com/office/drawing/2014/main" id="{E1919844-3CBF-48BA-F741-23A759BDC8AF}"/>
               </a:ext>
             </a:extLst>
           </p:cNvPr>
@@ -4505,7 +3849,7 @@
         </p:blipFill>
         <p:spPr>
           <a:xfrm>
-            <a:off x="5931216" y="3603976"/>
+            <a:off x="1779652" y="3429000"/>
             <a:ext cx="2524125" cy="571500"/>
           </a:xfrm>
           <a:prstGeom prst="rect">
@@ -4513,6 +3857,86 @@
           </a:prstGeom>
         </p:spPr>
       </p:pic>
+      <p:sp>
+        <p:nvSpPr>
+          <p:cNvPr id="11" name="Rectangle: Rounded Corners 10">
+            <a:extLst>
+              <a:ext uri="{FF2B5EF4-FFF2-40B4-BE49-F238E27FC236}">
+                <a16:creationId xmlns:a16="http://schemas.microsoft.com/office/drawing/2014/main" id="{DE2D1C37-828F-52E0-DE66-DC433DB5EC73}"/>
+              </a:ext>
+            </a:extLst>
+          </p:cNvPr>
+          <p:cNvSpPr/>
+          <p:nvPr/>
+        </p:nvSpPr>
+        <p:spPr>
+          <a:xfrm>
+            <a:off x="608225" y="5786649"/>
+            <a:ext cx="1757854" cy="646331"/>
+          </a:xfrm>
+          <a:prstGeom prst="roundRect">
+            <a:avLst/>
+          </a:prstGeom>
+          <a:noFill/>
+        </p:spPr>
+        <p:style>
+          <a:lnRef idx="2">
+            <a:schemeClr val="dk1"/>
+          </a:lnRef>
+          <a:fillRef idx="1">
+            <a:schemeClr val="lt1"/>
+          </a:fillRef>
+          <a:effectRef idx="0">
+            <a:schemeClr val="dk1"/>
+          </a:effectRef>
+          <a:fontRef idx="minor">
+            <a:schemeClr val="dk1"/>
+          </a:fontRef>
+        </p:style>
+        <p:txBody>
+          <a:bodyPr rtlCol="0" anchor="ctr"/>
+          <a:lstStyle/>
+          <a:p>
+            <a:pPr algn="ctr"/>
+            <a:endParaRPr lang="en-GB"/>
+          </a:p>
+        </p:txBody>
+      </p:sp>
+      <p:sp>
+        <p:nvSpPr>
+          <p:cNvPr id="17" name="TextBox 16">
+            <a:extLst>
+              <a:ext uri="{FF2B5EF4-FFF2-40B4-BE49-F238E27FC236}">
+                <a16:creationId xmlns:a16="http://schemas.microsoft.com/office/drawing/2014/main" id="{802C707F-BE42-36A7-3613-27E640DBDD6F}"/>
+              </a:ext>
+            </a:extLst>
+          </p:cNvPr>
+          <p:cNvSpPr txBox="1"/>
+          <p:nvPr/>
+        </p:nvSpPr>
+        <p:spPr>
+          <a:xfrm>
+            <a:off x="676496" y="5738346"/>
+            <a:ext cx="1757854" cy="646331"/>
+          </a:xfrm>
+          <a:prstGeom prst="rect">
+            <a:avLst/>
+          </a:prstGeom>
+          <a:noFill/>
+        </p:spPr>
+        <p:txBody>
+          <a:bodyPr wrap="square" rtlCol="0">
+            <a:spAutoFit/>
+          </a:bodyPr>
+          <a:lstStyle/>
+          <a:p>
+            <a:r>
+              <a:rPr lang="en-GB" dirty="0"/>
+              <a:t>Download IUCN points file</a:t>
+            </a:r>
+          </a:p>
+        </p:txBody>
+      </p:sp>
       <p:cxnSp>
         <p:nvCxnSpPr>
           <p:cNvPr id="33" name="Straight Connector 32">
@@ -4551,41 +3975,6 @@
       </p:cxnSp>
       <p:sp>
         <p:nvSpPr>
-          <p:cNvPr id="34" name="TextBox 33">
-            <a:extLst>
-              <a:ext uri="{FF2B5EF4-FFF2-40B4-BE49-F238E27FC236}">
-                <a16:creationId xmlns:a16="http://schemas.microsoft.com/office/drawing/2014/main" id="{A02DBF41-71CB-4416-9536-5B8E43BF2201}"/>
-              </a:ext>
-            </a:extLst>
-          </p:cNvPr>
-          <p:cNvSpPr txBox="1"/>
-          <p:nvPr/>
-        </p:nvSpPr>
-        <p:spPr>
-          <a:xfrm>
-            <a:off x="7578972" y="268528"/>
-            <a:ext cx="1093569" cy="369332"/>
-          </a:xfrm>
-          <a:prstGeom prst="rect">
-            <a:avLst/>
-          </a:prstGeom>
-          <a:noFill/>
-        </p:spPr>
-        <p:txBody>
-          <a:bodyPr wrap="none" rtlCol="0">
-            <a:spAutoFit/>
-          </a:bodyPr>
-          <a:lstStyle/>
-          <a:p>
-            <a:r>
-              <a:rPr lang="en-GB" b="1" dirty="0"/>
-              <a:t>GBIF only</a:t>
-            </a:r>
-          </a:p>
-        </p:txBody>
-      </p:sp>
-      <p:sp>
-        <p:nvSpPr>
           <p:cNvPr id="35" name="TextBox 34">
             <a:extLst>
               <a:ext uri="{FF2B5EF4-FFF2-40B4-BE49-F238E27FC236}">
@@ -4722,55 +4111,6 @@
           </a:p>
         </p:txBody>
       </p:sp>
-      <p:sp>
-        <p:nvSpPr>
-          <p:cNvPr id="38" name="Rectangle: Rounded Corners 37">
-            <a:extLst>
-              <a:ext uri="{FF2B5EF4-FFF2-40B4-BE49-F238E27FC236}">
-                <a16:creationId xmlns:a16="http://schemas.microsoft.com/office/drawing/2014/main" id="{4A543568-F0FD-07C9-C4BB-DE9E6FA41AD4}"/>
-              </a:ext>
-            </a:extLst>
-          </p:cNvPr>
-          <p:cNvSpPr/>
-          <p:nvPr/>
-        </p:nvSpPr>
-        <p:spPr>
-          <a:xfrm>
-            <a:off x="10257124" y="1033722"/>
-            <a:ext cx="1215297" cy="1332405"/>
-          </a:xfrm>
-          <a:prstGeom prst="roundRect">
-            <a:avLst/>
-          </a:prstGeom>
-        </p:spPr>
-        <p:style>
-          <a:lnRef idx="2">
-            <a:schemeClr val="accent1">
-              <a:shade val="50000"/>
-            </a:schemeClr>
-          </a:lnRef>
-          <a:fillRef idx="1">
-            <a:schemeClr val="accent1"/>
-          </a:fillRef>
-          <a:effectRef idx="0">
-            <a:schemeClr val="accent1"/>
-          </a:effectRef>
-          <a:fontRef idx="minor">
-            <a:schemeClr val="lt1"/>
-          </a:fontRef>
-        </p:style>
-        <p:txBody>
-          <a:bodyPr rtlCol="0" anchor="ctr"/>
-          <a:lstStyle/>
-          <a:p>
-            <a:pPr algn="ctr"/>
-            <a:r>
-              <a:rPr lang="en-GB" dirty="0"/>
-              <a:t>Needs points to be clickable to ID</a:t>
-            </a:r>
-          </a:p>
-        </p:txBody>
-      </p:sp>
     </p:spTree>
     <p:extLst>
       <p:ext uri="{BB962C8B-B14F-4D97-AF65-F5344CB8AC3E}">
@@ -4784,7 +4124,7 @@
 </p:sld>
 </file>
 
-<file path=ppt/slides/slide3.xml><?xml version="1.0" encoding="utf-8"?>
+<file path=ppt/slides/slide4.xml><?xml version="1.0" encoding="utf-8"?>
 <p:sld xmlns:a="http://schemas.openxmlformats.org/drawingml/2006/main" xmlns:r="http://schemas.openxmlformats.org/officeDocument/2006/relationships" xmlns:p="http://schemas.openxmlformats.org/presentationml/2006/main">
   <p:cSld>
     <p:spTree>

</xml_diff>

<commit_message>
deleted use case pptx
</commit_message>
<xml_diff>
--- a/docs/use_cases.pptx
+++ b/docs/use_cases.pptx
@@ -5,10 +5,12 @@
     <p:sldMasterId id="2147483648" r:id="rId1"/>
   </p:sldMasterIdLst>
   <p:sldIdLst>
-    <p:sldId id="256" r:id="rId2"/>
-    <p:sldId id="259" r:id="rId3"/>
-    <p:sldId id="257" r:id="rId4"/>
-    <p:sldId id="258" r:id="rId5"/>
+    <p:sldId id="260" r:id="rId2"/>
+    <p:sldId id="261" r:id="rId3"/>
+    <p:sldId id="256" r:id="rId4"/>
+    <p:sldId id="259" r:id="rId5"/>
+    <p:sldId id="257" r:id="rId6"/>
+    <p:sldId id="258" r:id="rId7"/>
   </p:sldIdLst>
   <p:sldSz cx="12192000" cy="6858000"/>
   <p:notesSz cx="6858000" cy="9144000"/>
@@ -264,7 +266,7 @@
           <a:p>
             <a:fld id="{BF29F057-5540-425C-9A2E-DD2639D75A35}" type="datetimeFigureOut">
               <a:rPr lang="en-GB" smtClean="0"/>
-              <a:t>31/01/2023</a:t>
+              <a:t>03/02/2023</a:t>
             </a:fld>
             <a:endParaRPr lang="en-GB"/>
           </a:p>
@@ -464,7 +466,7 @@
           <a:p>
             <a:fld id="{BF29F057-5540-425C-9A2E-DD2639D75A35}" type="datetimeFigureOut">
               <a:rPr lang="en-GB" smtClean="0"/>
-              <a:t>31/01/2023</a:t>
+              <a:t>03/02/2023</a:t>
             </a:fld>
             <a:endParaRPr lang="en-GB"/>
           </a:p>
@@ -674,7 +676,7 @@
           <a:p>
             <a:fld id="{BF29F057-5540-425C-9A2E-DD2639D75A35}" type="datetimeFigureOut">
               <a:rPr lang="en-GB" smtClean="0"/>
-              <a:t>31/01/2023</a:t>
+              <a:t>03/02/2023</a:t>
             </a:fld>
             <a:endParaRPr lang="en-GB"/>
           </a:p>
@@ -874,7 +876,7 @@
           <a:p>
             <a:fld id="{BF29F057-5540-425C-9A2E-DD2639D75A35}" type="datetimeFigureOut">
               <a:rPr lang="en-GB" smtClean="0"/>
-              <a:t>31/01/2023</a:t>
+              <a:t>03/02/2023</a:t>
             </a:fld>
             <a:endParaRPr lang="en-GB"/>
           </a:p>
@@ -1150,7 +1152,7 @@
           <a:p>
             <a:fld id="{BF29F057-5540-425C-9A2E-DD2639D75A35}" type="datetimeFigureOut">
               <a:rPr lang="en-GB" smtClean="0"/>
-              <a:t>31/01/2023</a:t>
+              <a:t>03/02/2023</a:t>
             </a:fld>
             <a:endParaRPr lang="en-GB"/>
           </a:p>
@@ -1418,7 +1420,7 @@
           <a:p>
             <a:fld id="{BF29F057-5540-425C-9A2E-DD2639D75A35}" type="datetimeFigureOut">
               <a:rPr lang="en-GB" smtClean="0"/>
-              <a:t>31/01/2023</a:t>
+              <a:t>03/02/2023</a:t>
             </a:fld>
             <a:endParaRPr lang="en-GB"/>
           </a:p>
@@ -1833,7 +1835,7 @@
           <a:p>
             <a:fld id="{BF29F057-5540-425C-9A2E-DD2639D75A35}" type="datetimeFigureOut">
               <a:rPr lang="en-GB" smtClean="0"/>
-              <a:t>31/01/2023</a:t>
+              <a:t>03/02/2023</a:t>
             </a:fld>
             <a:endParaRPr lang="en-GB"/>
           </a:p>
@@ -1975,7 +1977,7 @@
           <a:p>
             <a:fld id="{BF29F057-5540-425C-9A2E-DD2639D75A35}" type="datetimeFigureOut">
               <a:rPr lang="en-GB" smtClean="0"/>
-              <a:t>31/01/2023</a:t>
+              <a:t>03/02/2023</a:t>
             </a:fld>
             <a:endParaRPr lang="en-GB"/>
           </a:p>
@@ -2088,7 +2090,7 @@
           <a:p>
             <a:fld id="{BF29F057-5540-425C-9A2E-DD2639D75A35}" type="datetimeFigureOut">
               <a:rPr lang="en-GB" smtClean="0"/>
-              <a:t>31/01/2023</a:t>
+              <a:t>03/02/2023</a:t>
             </a:fld>
             <a:endParaRPr lang="en-GB"/>
           </a:p>
@@ -2401,7 +2403,7 @@
           <a:p>
             <a:fld id="{BF29F057-5540-425C-9A2E-DD2639D75A35}" type="datetimeFigureOut">
               <a:rPr lang="en-GB" smtClean="0"/>
-              <a:t>31/01/2023</a:t>
+              <a:t>03/02/2023</a:t>
             </a:fld>
             <a:endParaRPr lang="en-GB"/>
           </a:p>
@@ -2690,7 +2692,7 @@
           <a:p>
             <a:fld id="{BF29F057-5540-425C-9A2E-DD2639D75A35}" type="datetimeFigureOut">
               <a:rPr lang="en-GB" smtClean="0"/>
-              <a:t>31/01/2023</a:t>
+              <a:t>03/02/2023</a:t>
             </a:fld>
             <a:endParaRPr lang="en-GB"/>
           </a:p>
@@ -2933,7 +2935,7 @@
           <a:p>
             <a:fld id="{BF29F057-5540-425C-9A2E-DD2639D75A35}" type="datetimeFigureOut">
               <a:rPr lang="en-GB" smtClean="0"/>
-              <a:t>31/01/2023</a:t>
+              <a:t>03/02/2023</a:t>
             </a:fld>
             <a:endParaRPr lang="en-GB"/>
           </a:p>
@@ -3350,6 +3352,913 @@
           <a:chExt cx="0" cy="0"/>
         </a:xfrm>
       </p:grpSpPr>
+      <p:sp>
+        <p:nvSpPr>
+          <p:cNvPr id="2" name="Title 1">
+            <a:extLst>
+              <a:ext uri="{FF2B5EF4-FFF2-40B4-BE49-F238E27FC236}">
+                <a16:creationId xmlns:a16="http://schemas.microsoft.com/office/drawing/2014/main" id="{28C73E57-DB10-7E87-8930-883ED65F412B}"/>
+              </a:ext>
+            </a:extLst>
+          </p:cNvPr>
+          <p:cNvSpPr>
+            <a:spLocks noGrp="1"/>
+          </p:cNvSpPr>
+          <p:nvPr>
+            <p:ph type="title"/>
+          </p:nvPr>
+        </p:nvSpPr>
+        <p:spPr/>
+        <p:txBody>
+          <a:bodyPr/>
+          <a:lstStyle/>
+          <a:p>
+            <a:r>
+              <a:rPr lang="en-GB" dirty="0"/>
+              <a:t>Handling points table in </a:t>
+            </a:r>
+            <a:r>
+              <a:rPr lang="en-GB" dirty="0" err="1"/>
+              <a:t>shinyGeoCAT</a:t>
+            </a:r>
+            <a:endParaRPr lang="en-GB" dirty="0"/>
+          </a:p>
+        </p:txBody>
+      </p:sp>
+      <p:sp>
+        <p:nvSpPr>
+          <p:cNvPr id="5" name="Rectangle 4">
+            <a:extLst>
+              <a:ext uri="{FF2B5EF4-FFF2-40B4-BE49-F238E27FC236}">
+                <a16:creationId xmlns:a16="http://schemas.microsoft.com/office/drawing/2014/main" id="{A2376BE0-BA9E-8D8C-4107-9C359C7B0F7B}"/>
+              </a:ext>
+            </a:extLst>
+          </p:cNvPr>
+          <p:cNvSpPr/>
+          <p:nvPr/>
+        </p:nvSpPr>
+        <p:spPr>
+          <a:xfrm>
+            <a:off x="510362" y="1775638"/>
+            <a:ext cx="3072811" cy="1057940"/>
+          </a:xfrm>
+          <a:prstGeom prst="rect">
+            <a:avLst/>
+          </a:prstGeom>
+        </p:spPr>
+        <p:style>
+          <a:lnRef idx="2">
+            <a:schemeClr val="accent1">
+              <a:shade val="50000"/>
+            </a:schemeClr>
+          </a:lnRef>
+          <a:fillRef idx="1">
+            <a:schemeClr val="accent1"/>
+          </a:fillRef>
+          <a:effectRef idx="0">
+            <a:schemeClr val="accent1"/>
+          </a:effectRef>
+          <a:fontRef idx="minor">
+            <a:schemeClr val="lt1"/>
+          </a:fontRef>
+        </p:style>
+        <p:txBody>
+          <a:bodyPr rtlCol="0" anchor="ctr"/>
+          <a:lstStyle/>
+          <a:p>
+            <a:pPr algn="ctr"/>
+            <a:r>
+              <a:rPr lang="en-GB" dirty="0"/>
+              <a:t>User CSV</a:t>
+            </a:r>
+          </a:p>
+          <a:p>
+            <a:pPr algn="ctr"/>
+            <a:r>
+              <a:rPr lang="en-GB" dirty="0"/>
+              <a:t>Required: latitude, longitude</a:t>
+            </a:r>
+          </a:p>
+          <a:p>
+            <a:pPr algn="ctr"/>
+            <a:r>
+              <a:rPr lang="en-GB" dirty="0"/>
+              <a:t>Optional: standard fields</a:t>
+            </a:r>
+          </a:p>
+          <a:p>
+            <a:pPr algn="ctr"/>
+            <a:endParaRPr lang="en-GB" dirty="0"/>
+          </a:p>
+        </p:txBody>
+      </p:sp>
+      <p:sp>
+        <p:nvSpPr>
+          <p:cNvPr id="6" name="Rectangle 5">
+            <a:extLst>
+              <a:ext uri="{FF2B5EF4-FFF2-40B4-BE49-F238E27FC236}">
+                <a16:creationId xmlns:a16="http://schemas.microsoft.com/office/drawing/2014/main" id="{94A35352-5A45-AFA0-49E8-1FB8085CA61F}"/>
+              </a:ext>
+            </a:extLst>
+          </p:cNvPr>
+          <p:cNvSpPr/>
+          <p:nvPr/>
+        </p:nvSpPr>
+        <p:spPr>
+          <a:xfrm>
+            <a:off x="4933508" y="3242930"/>
+            <a:ext cx="1754372" cy="1010093"/>
+          </a:xfrm>
+          <a:prstGeom prst="rect">
+            <a:avLst/>
+          </a:prstGeom>
+        </p:spPr>
+        <p:style>
+          <a:lnRef idx="2">
+            <a:schemeClr val="accent2">
+              <a:shade val="50000"/>
+            </a:schemeClr>
+          </a:lnRef>
+          <a:fillRef idx="1">
+            <a:schemeClr val="accent2"/>
+          </a:fillRef>
+          <a:effectRef idx="0">
+            <a:schemeClr val="accent2"/>
+          </a:effectRef>
+          <a:fontRef idx="minor">
+            <a:schemeClr val="lt1"/>
+          </a:fontRef>
+        </p:style>
+        <p:txBody>
+          <a:bodyPr rtlCol="0" anchor="ctr"/>
+          <a:lstStyle/>
+          <a:p>
+            <a:pPr algn="ctr"/>
+            <a:r>
+              <a:rPr lang="en-GB" dirty="0"/>
+              <a:t>Standard fields</a:t>
+            </a:r>
+          </a:p>
+        </p:txBody>
+      </p:sp>
+      <p:sp>
+        <p:nvSpPr>
+          <p:cNvPr id="7" name="Rectangle 6">
+            <a:extLst>
+              <a:ext uri="{FF2B5EF4-FFF2-40B4-BE49-F238E27FC236}">
+                <a16:creationId xmlns:a16="http://schemas.microsoft.com/office/drawing/2014/main" id="{3961D385-18DC-E3FE-3FAE-4188A0A3EE04}"/>
+              </a:ext>
+            </a:extLst>
+          </p:cNvPr>
+          <p:cNvSpPr/>
+          <p:nvPr/>
+        </p:nvSpPr>
+        <p:spPr>
+          <a:xfrm>
+            <a:off x="8052391" y="1775638"/>
+            <a:ext cx="3072811" cy="1057940"/>
+          </a:xfrm>
+          <a:prstGeom prst="rect">
+            <a:avLst/>
+          </a:prstGeom>
+        </p:spPr>
+        <p:style>
+          <a:lnRef idx="2">
+            <a:schemeClr val="accent6">
+              <a:shade val="50000"/>
+            </a:schemeClr>
+          </a:lnRef>
+          <a:fillRef idx="1">
+            <a:schemeClr val="accent6"/>
+          </a:fillRef>
+          <a:effectRef idx="0">
+            <a:schemeClr val="accent6"/>
+          </a:effectRef>
+          <a:fontRef idx="minor">
+            <a:schemeClr val="lt1"/>
+          </a:fontRef>
+        </p:style>
+        <p:txBody>
+          <a:bodyPr rtlCol="0" anchor="ctr"/>
+          <a:lstStyle/>
+          <a:p>
+            <a:pPr algn="ctr"/>
+            <a:r>
+              <a:rPr lang="en-GB" dirty="0"/>
+              <a:t>GBIF import</a:t>
+            </a:r>
+          </a:p>
+          <a:p>
+            <a:pPr algn="ctr"/>
+            <a:r>
+              <a:rPr lang="en-GB" dirty="0"/>
+              <a:t>Required: latitude, longitude</a:t>
+            </a:r>
+          </a:p>
+          <a:p>
+            <a:pPr algn="ctr"/>
+            <a:r>
+              <a:rPr lang="en-GB" dirty="0"/>
+              <a:t>Optional: standard fields</a:t>
+            </a:r>
+          </a:p>
+          <a:p>
+            <a:pPr algn="ctr"/>
+            <a:endParaRPr lang="en-GB" dirty="0"/>
+          </a:p>
+        </p:txBody>
+      </p:sp>
+      <p:cxnSp>
+        <p:nvCxnSpPr>
+          <p:cNvPr id="9" name="Straight Arrow Connector 8">
+            <a:extLst>
+              <a:ext uri="{FF2B5EF4-FFF2-40B4-BE49-F238E27FC236}">
+                <a16:creationId xmlns:a16="http://schemas.microsoft.com/office/drawing/2014/main" id="{FE8872D7-4DD7-6729-9B66-4698AFC9ED2A}"/>
+              </a:ext>
+            </a:extLst>
+          </p:cNvPr>
+          <p:cNvCxnSpPr>
+            <a:stCxn id="5" idx="2"/>
+            <a:endCxn id="6" idx="1"/>
+          </p:cNvCxnSpPr>
+          <p:nvPr/>
+        </p:nvCxnSpPr>
+        <p:spPr>
+          <a:xfrm>
+            <a:off x="2046768" y="2833578"/>
+            <a:ext cx="2886740" cy="914399"/>
+          </a:xfrm>
+          <a:prstGeom prst="straightConnector1">
+            <a:avLst/>
+          </a:prstGeom>
+          <a:ln>
+            <a:tailEnd type="triangle"/>
+          </a:ln>
+        </p:spPr>
+        <p:style>
+          <a:lnRef idx="1">
+            <a:schemeClr val="accent1"/>
+          </a:lnRef>
+          <a:fillRef idx="0">
+            <a:schemeClr val="accent1"/>
+          </a:fillRef>
+          <a:effectRef idx="0">
+            <a:schemeClr val="accent1"/>
+          </a:effectRef>
+          <a:fontRef idx="minor">
+            <a:schemeClr val="tx1"/>
+          </a:fontRef>
+        </p:style>
+      </p:cxnSp>
+      <p:cxnSp>
+        <p:nvCxnSpPr>
+          <p:cNvPr id="11" name="Straight Arrow Connector 10">
+            <a:extLst>
+              <a:ext uri="{FF2B5EF4-FFF2-40B4-BE49-F238E27FC236}">
+                <a16:creationId xmlns:a16="http://schemas.microsoft.com/office/drawing/2014/main" id="{A9E87AF6-A75E-B7B3-99DB-FDBA457783EB}"/>
+              </a:ext>
+            </a:extLst>
+          </p:cNvPr>
+          <p:cNvCxnSpPr>
+            <a:stCxn id="7" idx="2"/>
+            <a:endCxn id="6" idx="3"/>
+          </p:cNvCxnSpPr>
+          <p:nvPr/>
+        </p:nvCxnSpPr>
+        <p:spPr>
+          <a:xfrm flipH="1">
+            <a:off x="6687880" y="2833578"/>
+            <a:ext cx="2900917" cy="914399"/>
+          </a:xfrm>
+          <a:prstGeom prst="straightConnector1">
+            <a:avLst/>
+          </a:prstGeom>
+          <a:ln>
+            <a:tailEnd type="triangle"/>
+          </a:ln>
+        </p:spPr>
+        <p:style>
+          <a:lnRef idx="2">
+            <a:schemeClr val="accent6"/>
+          </a:lnRef>
+          <a:fillRef idx="0">
+            <a:schemeClr val="accent6"/>
+          </a:fillRef>
+          <a:effectRef idx="1">
+            <a:schemeClr val="accent6"/>
+          </a:effectRef>
+          <a:fontRef idx="minor">
+            <a:schemeClr val="tx1"/>
+          </a:fontRef>
+        </p:style>
+      </p:cxnSp>
+    </p:spTree>
+    <p:extLst>
+      <p:ext uri="{BB962C8B-B14F-4D97-AF65-F5344CB8AC3E}">
+        <p14:creationId xmlns:p14="http://schemas.microsoft.com/office/powerpoint/2010/main" val="27764549"/>
+      </p:ext>
+    </p:extLst>
+  </p:cSld>
+  <p:clrMapOvr>
+    <a:masterClrMapping/>
+  </p:clrMapOvr>
+</p:sld>
+</file>
+
+<file path=ppt/slides/slide2.xml><?xml version="1.0" encoding="utf-8"?>
+<p:sld xmlns:a="http://schemas.openxmlformats.org/drawingml/2006/main" xmlns:r="http://schemas.openxmlformats.org/officeDocument/2006/relationships" xmlns:p="http://schemas.openxmlformats.org/presentationml/2006/main">
+  <p:cSld>
+    <p:spTree>
+      <p:nvGrpSpPr>
+        <p:cNvPr id="1" name=""/>
+        <p:cNvGrpSpPr/>
+        <p:nvPr/>
+      </p:nvGrpSpPr>
+      <p:grpSpPr>
+        <a:xfrm>
+          <a:off x="0" y="0"/>
+          <a:ext cx="0" cy="0"/>
+          <a:chOff x="0" y="0"/>
+          <a:chExt cx="0" cy="0"/>
+        </a:xfrm>
+      </p:grpSpPr>
+      <p:sp>
+        <p:nvSpPr>
+          <p:cNvPr id="5" name="Rectangle 4">
+            <a:extLst>
+              <a:ext uri="{FF2B5EF4-FFF2-40B4-BE49-F238E27FC236}">
+                <a16:creationId xmlns:a16="http://schemas.microsoft.com/office/drawing/2014/main" id="{A2376BE0-BA9E-8D8C-4107-9C359C7B0F7B}"/>
+              </a:ext>
+            </a:extLst>
+          </p:cNvPr>
+          <p:cNvSpPr/>
+          <p:nvPr/>
+        </p:nvSpPr>
+        <p:spPr>
+          <a:xfrm>
+            <a:off x="425300" y="404038"/>
+            <a:ext cx="3072811" cy="1057940"/>
+          </a:xfrm>
+          <a:prstGeom prst="rect">
+            <a:avLst/>
+          </a:prstGeom>
+        </p:spPr>
+        <p:style>
+          <a:lnRef idx="2">
+            <a:schemeClr val="accent1">
+              <a:shade val="50000"/>
+            </a:schemeClr>
+          </a:lnRef>
+          <a:fillRef idx="1">
+            <a:schemeClr val="accent1"/>
+          </a:fillRef>
+          <a:effectRef idx="0">
+            <a:schemeClr val="accent1"/>
+          </a:effectRef>
+          <a:fontRef idx="minor">
+            <a:schemeClr val="lt1"/>
+          </a:fontRef>
+        </p:style>
+        <p:txBody>
+          <a:bodyPr rtlCol="0" anchor="ctr"/>
+          <a:lstStyle/>
+          <a:p>
+            <a:pPr algn="ctr"/>
+            <a:r>
+              <a:rPr lang="en-GB" dirty="0"/>
+              <a:t>User CSV</a:t>
+            </a:r>
+          </a:p>
+          <a:p>
+            <a:pPr algn="ctr"/>
+            <a:r>
+              <a:rPr lang="en-GB" dirty="0"/>
+              <a:t>Required: latitude, longitude</a:t>
+            </a:r>
+          </a:p>
+          <a:p>
+            <a:pPr algn="ctr"/>
+            <a:r>
+              <a:rPr lang="en-GB" dirty="0"/>
+              <a:t>Optional: standard fields</a:t>
+            </a:r>
+          </a:p>
+          <a:p>
+            <a:pPr algn="ctr"/>
+            <a:endParaRPr lang="en-GB" dirty="0"/>
+          </a:p>
+        </p:txBody>
+      </p:sp>
+      <p:sp>
+        <p:nvSpPr>
+          <p:cNvPr id="6" name="Rectangle 5">
+            <a:extLst>
+              <a:ext uri="{FF2B5EF4-FFF2-40B4-BE49-F238E27FC236}">
+                <a16:creationId xmlns:a16="http://schemas.microsoft.com/office/drawing/2014/main" id="{94A35352-5A45-AFA0-49E8-1FB8085CA61F}"/>
+              </a:ext>
+            </a:extLst>
+          </p:cNvPr>
+          <p:cNvSpPr/>
+          <p:nvPr/>
+        </p:nvSpPr>
+        <p:spPr>
+          <a:xfrm>
+            <a:off x="5199320" y="451885"/>
+            <a:ext cx="6567380" cy="547575"/>
+          </a:xfrm>
+          <a:prstGeom prst="rect">
+            <a:avLst/>
+          </a:prstGeom>
+        </p:spPr>
+        <p:style>
+          <a:lnRef idx="2">
+            <a:schemeClr val="accent2">
+              <a:shade val="50000"/>
+            </a:schemeClr>
+          </a:lnRef>
+          <a:fillRef idx="1">
+            <a:schemeClr val="accent2"/>
+          </a:fillRef>
+          <a:effectRef idx="0">
+            <a:schemeClr val="accent2"/>
+          </a:effectRef>
+          <a:fontRef idx="minor">
+            <a:schemeClr val="lt1"/>
+          </a:fontRef>
+        </p:style>
+        <p:txBody>
+          <a:bodyPr rtlCol="0" anchor="ctr"/>
+          <a:lstStyle/>
+          <a:p>
+            <a:pPr algn="ctr"/>
+            <a:r>
+              <a:rPr lang="en-GB" dirty="0"/>
+              <a:t>Standard fields</a:t>
+            </a:r>
+          </a:p>
+        </p:txBody>
+      </p:sp>
+      <p:cxnSp>
+        <p:nvCxnSpPr>
+          <p:cNvPr id="9" name="Straight Arrow Connector 8">
+            <a:extLst>
+              <a:ext uri="{FF2B5EF4-FFF2-40B4-BE49-F238E27FC236}">
+                <a16:creationId xmlns:a16="http://schemas.microsoft.com/office/drawing/2014/main" id="{FE8872D7-4DD7-6729-9B66-4698AFC9ED2A}"/>
+              </a:ext>
+            </a:extLst>
+          </p:cNvPr>
+          <p:cNvCxnSpPr>
+            <a:cxnSpLocks/>
+            <a:stCxn id="5" idx="3"/>
+            <a:endCxn id="6" idx="1"/>
+          </p:cNvCxnSpPr>
+          <p:nvPr/>
+        </p:nvCxnSpPr>
+        <p:spPr>
+          <a:xfrm flipV="1">
+            <a:off x="3498111" y="725673"/>
+            <a:ext cx="1701209" cy="207335"/>
+          </a:xfrm>
+          <a:prstGeom prst="straightConnector1">
+            <a:avLst/>
+          </a:prstGeom>
+          <a:ln>
+            <a:tailEnd type="triangle"/>
+          </a:ln>
+        </p:spPr>
+        <p:style>
+          <a:lnRef idx="1">
+            <a:schemeClr val="accent1"/>
+          </a:lnRef>
+          <a:fillRef idx="0">
+            <a:schemeClr val="accent1"/>
+          </a:fillRef>
+          <a:effectRef idx="0">
+            <a:schemeClr val="accent1"/>
+          </a:effectRef>
+          <a:fontRef idx="minor">
+            <a:schemeClr val="tx1"/>
+          </a:fontRef>
+        </p:style>
+      </p:cxnSp>
+      <p:graphicFrame>
+        <p:nvGraphicFramePr>
+          <p:cNvPr id="12" name="Table 12">
+            <a:extLst>
+              <a:ext uri="{FF2B5EF4-FFF2-40B4-BE49-F238E27FC236}">
+                <a16:creationId xmlns:a16="http://schemas.microsoft.com/office/drawing/2014/main" id="{06BBF09A-6642-11E5-ED50-2D929DD1ED17}"/>
+              </a:ext>
+            </a:extLst>
+          </p:cNvPr>
+          <p:cNvGraphicFramePr>
+            <a:graphicFrameLocks noGrp="1"/>
+          </p:cNvGraphicFramePr>
+          <p:nvPr>
+            <p:extLst>
+              <p:ext uri="{D42A27DB-BD31-4B8C-83A1-F6EECF244321}">
+                <p14:modId xmlns:p14="http://schemas.microsoft.com/office/powerpoint/2010/main" val="3703554324"/>
+              </p:ext>
+            </p:extLst>
+          </p:nvPr>
+        </p:nvGraphicFramePr>
+        <p:xfrm>
+          <a:off x="5199320" y="1206796"/>
+          <a:ext cx="6567380" cy="2789483"/>
+        </p:xfrm>
+        <a:graphic>
+          <a:graphicData uri="http://schemas.openxmlformats.org/drawingml/2006/table">
+            <a:tbl>
+              <a:tblPr firstRow="1" bandRow="1">
+                <a:tableStyleId>{F5AB1C69-6EDB-4FF4-983F-18BD219EF322}</a:tableStyleId>
+              </a:tblPr>
+              <a:tblGrid>
+                <a:gridCol w="2244250">
+                  <a:extLst>
+                    <a:ext uri="{9D8B030D-6E8A-4147-A177-3AD203B41FA5}">
+                      <a16:colId xmlns:a16="http://schemas.microsoft.com/office/drawing/2014/main" val="345210421"/>
+                    </a:ext>
+                  </a:extLst>
+                </a:gridCol>
+                <a:gridCol w="1724528">
+                  <a:extLst>
+                    <a:ext uri="{9D8B030D-6E8A-4147-A177-3AD203B41FA5}">
+                      <a16:colId xmlns:a16="http://schemas.microsoft.com/office/drawing/2014/main" val="2915139837"/>
+                    </a:ext>
+                  </a:extLst>
+                </a:gridCol>
+                <a:gridCol w="2598602">
+                  <a:extLst>
+                    <a:ext uri="{9D8B030D-6E8A-4147-A177-3AD203B41FA5}">
+                      <a16:colId xmlns:a16="http://schemas.microsoft.com/office/drawing/2014/main" val="855976070"/>
+                    </a:ext>
+                  </a:extLst>
+                </a:gridCol>
+              </a:tblGrid>
+              <a:tr h="501195">
+                <a:tc>
+                  <a:txBody>
+                    <a:bodyPr/>
+                    <a:lstStyle/>
+                    <a:p>
+                      <a:r>
+                        <a:rPr lang="en-GB" sz="1600" dirty="0"/>
+                        <a:t>Name</a:t>
+                      </a:r>
+                    </a:p>
+                  </a:txBody>
+                  <a:tcPr/>
+                </a:tc>
+                <a:tc>
+                  <a:txBody>
+                    <a:bodyPr/>
+                    <a:lstStyle/>
+                    <a:p>
+                      <a:r>
+                        <a:rPr lang="en-GB" sz="1600" dirty="0"/>
+                        <a:t>Format</a:t>
+                      </a:r>
+                    </a:p>
+                  </a:txBody>
+                  <a:tcPr/>
+                </a:tc>
+                <a:tc>
+                  <a:txBody>
+                    <a:bodyPr/>
+                    <a:lstStyle/>
+                    <a:p>
+                      <a:r>
+                        <a:rPr lang="en-GB" sz="1600" dirty="0"/>
+                        <a:t>Notes</a:t>
+                      </a:r>
+                    </a:p>
+                  </a:txBody>
+                  <a:tcPr/>
+                </a:tc>
+                <a:extLst>
+                  <a:ext uri="{0D108BD9-81ED-4DB2-BD59-A6C34878D82A}">
+                    <a16:rowId xmlns:a16="http://schemas.microsoft.com/office/drawing/2014/main" val="2303820299"/>
+                  </a:ext>
+                </a:extLst>
+              </a:tr>
+              <a:tr h="501195">
+                <a:tc>
+                  <a:txBody>
+                    <a:bodyPr/>
+                    <a:lstStyle/>
+                    <a:p>
+                      <a:r>
+                        <a:rPr lang="en-GB" sz="1600" dirty="0" err="1"/>
+                        <a:t>geocat_id</a:t>
+                      </a:r>
+                      <a:endParaRPr lang="en-GB" sz="1600" dirty="0"/>
+                    </a:p>
+                  </a:txBody>
+                  <a:tcPr/>
+                </a:tc>
+                <a:tc>
+                  <a:txBody>
+                    <a:bodyPr/>
+                    <a:lstStyle/>
+                    <a:p>
+                      <a:r>
+                        <a:rPr lang="en-GB" sz="1600" dirty="0"/>
+                        <a:t>numeric</a:t>
+                      </a:r>
+                    </a:p>
+                  </a:txBody>
+                  <a:tcPr/>
+                </a:tc>
+                <a:tc>
+                  <a:txBody>
+                    <a:bodyPr/>
+                    <a:lstStyle/>
+                    <a:p>
+                      <a:endParaRPr lang="en-GB" sz="1600" dirty="0"/>
+                    </a:p>
+                  </a:txBody>
+                  <a:tcPr/>
+                </a:tc>
+                <a:extLst>
+                  <a:ext uri="{0D108BD9-81ED-4DB2-BD59-A6C34878D82A}">
+                    <a16:rowId xmlns:a16="http://schemas.microsoft.com/office/drawing/2014/main" val="3710612403"/>
+                  </a:ext>
+                </a:extLst>
+              </a:tr>
+              <a:tr h="427688">
+                <a:tc>
+                  <a:txBody>
+                    <a:bodyPr/>
+                    <a:lstStyle/>
+                    <a:p>
+                      <a:r>
+                        <a:rPr lang="en-GB" sz="1600" dirty="0" err="1"/>
+                        <a:t>geocat_source</a:t>
+                      </a:r>
+                      <a:endParaRPr lang="en-GB" sz="1600" dirty="0"/>
+                    </a:p>
+                  </a:txBody>
+                  <a:tcPr/>
+                </a:tc>
+                <a:tc>
+                  <a:txBody>
+                    <a:bodyPr/>
+                    <a:lstStyle/>
+                    <a:p>
+                      <a:r>
+                        <a:rPr lang="en-GB" sz="1600" dirty="0"/>
+                        <a:t>csv, </a:t>
+                      </a:r>
+                      <a:r>
+                        <a:rPr lang="en-GB" sz="1600" dirty="0" err="1"/>
+                        <a:t>gbif</a:t>
+                      </a:r>
+                      <a:r>
+                        <a:rPr lang="en-GB" sz="1600" dirty="0"/>
+                        <a:t>, user</a:t>
+                      </a:r>
+                    </a:p>
+                  </a:txBody>
+                  <a:tcPr/>
+                </a:tc>
+                <a:tc>
+                  <a:txBody>
+                    <a:bodyPr/>
+                    <a:lstStyle/>
+                    <a:p>
+                      <a:r>
+                        <a:rPr lang="en-GB" sz="1600" dirty="0"/>
+                        <a:t>user is points added to map</a:t>
+                      </a:r>
+                    </a:p>
+                  </a:txBody>
+                  <a:tcPr/>
+                </a:tc>
+                <a:extLst>
+                  <a:ext uri="{0D108BD9-81ED-4DB2-BD59-A6C34878D82A}">
+                    <a16:rowId xmlns:a16="http://schemas.microsoft.com/office/drawing/2014/main" val="1265791424"/>
+                  </a:ext>
+                </a:extLst>
+              </a:tr>
+              <a:tr h="453135">
+                <a:tc>
+                  <a:txBody>
+                    <a:bodyPr/>
+                    <a:lstStyle/>
+                    <a:p>
+                      <a:r>
+                        <a:rPr lang="en-GB" sz="1600" dirty="0" err="1"/>
+                        <a:t>geocat_edit_id</a:t>
+                      </a:r>
+                      <a:endParaRPr lang="en-GB" sz="1600" dirty="0"/>
+                    </a:p>
+                  </a:txBody>
+                  <a:tcPr/>
+                </a:tc>
+                <a:tc>
+                  <a:txBody>
+                    <a:bodyPr/>
+                    <a:lstStyle/>
+                    <a:p>
+                      <a:pPr marL="0" marR="0" lvl="0" indent="0" algn="l" defTabSz="914400" rtl="0" eaLnBrk="1" fontAlgn="auto" latinLnBrk="0" hangingPunct="1">
+                        <a:lnSpc>
+                          <a:spcPct val="100000"/>
+                        </a:lnSpc>
+                        <a:spcBef>
+                          <a:spcPts val="0"/>
+                        </a:spcBef>
+                        <a:spcAft>
+                          <a:spcPts val="0"/>
+                        </a:spcAft>
+                        <a:buClrTx/>
+                        <a:buSzTx/>
+                        <a:buFontTx/>
+                        <a:buNone/>
+                        <a:tabLst/>
+                        <a:defRPr/>
+                      </a:pPr>
+                      <a:r>
+                        <a:rPr lang="en-GB" sz="1600" dirty="0"/>
+                        <a:t>numeric</a:t>
+                      </a:r>
+                    </a:p>
+                  </a:txBody>
+                  <a:tcPr/>
+                </a:tc>
+                <a:tc>
+                  <a:txBody>
+                    <a:bodyPr/>
+                    <a:lstStyle/>
+                    <a:p>
+                      <a:r>
+                        <a:rPr lang="en-GB" sz="1600" dirty="0"/>
+                        <a:t>id when edited</a:t>
+                      </a:r>
+                    </a:p>
+                  </a:txBody>
+                  <a:tcPr/>
+                </a:tc>
+                <a:extLst>
+                  <a:ext uri="{0D108BD9-81ED-4DB2-BD59-A6C34878D82A}">
+                    <a16:rowId xmlns:a16="http://schemas.microsoft.com/office/drawing/2014/main" val="1641534318"/>
+                  </a:ext>
+                </a:extLst>
+              </a:tr>
+              <a:tr h="453135">
+                <a:tc>
+                  <a:txBody>
+                    <a:bodyPr/>
+                    <a:lstStyle/>
+                    <a:p>
+                      <a:r>
+                        <a:rPr lang="en-GB" sz="1600" dirty="0" err="1"/>
+                        <a:t>geocat_status</a:t>
+                      </a:r>
+                      <a:endParaRPr lang="en-GB" sz="1600" dirty="0"/>
+                    </a:p>
+                  </a:txBody>
+                  <a:tcPr/>
+                </a:tc>
+                <a:tc>
+                  <a:txBody>
+                    <a:bodyPr/>
+                    <a:lstStyle/>
+                    <a:p>
+                      <a:pPr marL="0" marR="0" lvl="0" indent="0" algn="l" defTabSz="914400" rtl="0" eaLnBrk="1" fontAlgn="auto" latinLnBrk="0" hangingPunct="1">
+                        <a:lnSpc>
+                          <a:spcPct val="100000"/>
+                        </a:lnSpc>
+                        <a:spcBef>
+                          <a:spcPts val="0"/>
+                        </a:spcBef>
+                        <a:spcAft>
+                          <a:spcPts val="0"/>
+                        </a:spcAft>
+                        <a:buClrTx/>
+                        <a:buSzTx/>
+                        <a:buFontTx/>
+                        <a:buNone/>
+                        <a:tabLst/>
+                        <a:defRPr/>
+                      </a:pPr>
+                      <a:r>
+                        <a:rPr lang="en-GB" sz="1600" dirty="0"/>
+                        <a:t>char</a:t>
+                      </a:r>
+                    </a:p>
+                  </a:txBody>
+                  <a:tcPr/>
+                </a:tc>
+                <a:tc>
+                  <a:txBody>
+                    <a:bodyPr/>
+                    <a:lstStyle/>
+                    <a:p>
+                      <a:r>
+                        <a:rPr lang="en-GB" sz="1600" dirty="0" err="1"/>
+                        <a:t>new_point</a:t>
+                      </a:r>
+                      <a:r>
+                        <a:rPr lang="en-GB" sz="1600" dirty="0"/>
+                        <a:t>, moved, deleted</a:t>
+                      </a:r>
+                    </a:p>
+                  </a:txBody>
+                  <a:tcPr/>
+                </a:tc>
+                <a:extLst>
+                  <a:ext uri="{0D108BD9-81ED-4DB2-BD59-A6C34878D82A}">
+                    <a16:rowId xmlns:a16="http://schemas.microsoft.com/office/drawing/2014/main" val="1297338112"/>
+                  </a:ext>
+                </a:extLst>
+              </a:tr>
+              <a:tr h="453135">
+                <a:tc>
+                  <a:txBody>
+                    <a:bodyPr/>
+                    <a:lstStyle/>
+                    <a:p>
+                      <a:endParaRPr lang="en-GB" sz="1600" dirty="0"/>
+                    </a:p>
+                  </a:txBody>
+                  <a:tcPr/>
+                </a:tc>
+                <a:tc>
+                  <a:txBody>
+                    <a:bodyPr/>
+                    <a:lstStyle/>
+                    <a:p>
+                      <a:pPr marL="0" marR="0" lvl="0" indent="0" algn="l" defTabSz="914400" rtl="0" eaLnBrk="1" fontAlgn="auto" latinLnBrk="0" hangingPunct="1">
+                        <a:lnSpc>
+                          <a:spcPct val="100000"/>
+                        </a:lnSpc>
+                        <a:spcBef>
+                          <a:spcPts val="0"/>
+                        </a:spcBef>
+                        <a:spcAft>
+                          <a:spcPts val="0"/>
+                        </a:spcAft>
+                        <a:buClrTx/>
+                        <a:buSzTx/>
+                        <a:buFontTx/>
+                        <a:buNone/>
+                        <a:tabLst/>
+                        <a:defRPr/>
+                      </a:pPr>
+                      <a:endParaRPr lang="en-GB" sz="1600" dirty="0"/>
+                    </a:p>
+                  </a:txBody>
+                  <a:tcPr/>
+                </a:tc>
+                <a:tc>
+                  <a:txBody>
+                    <a:bodyPr/>
+                    <a:lstStyle/>
+                    <a:p>
+                      <a:endParaRPr lang="en-GB" sz="1600" dirty="0"/>
+                    </a:p>
+                  </a:txBody>
+                  <a:tcPr/>
+                </a:tc>
+                <a:extLst>
+                  <a:ext uri="{0D108BD9-81ED-4DB2-BD59-A6C34878D82A}">
+                    <a16:rowId xmlns:a16="http://schemas.microsoft.com/office/drawing/2014/main" val="2216695678"/>
+                  </a:ext>
+                </a:extLst>
+              </a:tr>
+            </a:tbl>
+          </a:graphicData>
+        </a:graphic>
+      </p:graphicFrame>
+    </p:spTree>
+    <p:extLst>
+      <p:ext uri="{BB962C8B-B14F-4D97-AF65-F5344CB8AC3E}">
+        <p14:creationId xmlns:p14="http://schemas.microsoft.com/office/powerpoint/2010/main" val="721290094"/>
+      </p:ext>
+    </p:extLst>
+  </p:cSld>
+  <p:clrMapOvr>
+    <a:masterClrMapping/>
+  </p:clrMapOvr>
+</p:sld>
+</file>
+
+<file path=ppt/slides/slide3.xml><?xml version="1.0" encoding="utf-8"?>
+<p:sld xmlns:a="http://schemas.openxmlformats.org/drawingml/2006/main" xmlns:r="http://schemas.openxmlformats.org/officeDocument/2006/relationships" xmlns:p="http://schemas.openxmlformats.org/presentationml/2006/main">
+  <p:cSld>
+    <p:spTree>
+      <p:nvGrpSpPr>
+        <p:cNvPr id="1" name=""/>
+        <p:cNvGrpSpPr/>
+        <p:nvPr/>
+      </p:nvGrpSpPr>
+      <p:grpSpPr>
+        <a:xfrm>
+          <a:off x="0" y="0"/>
+          <a:ext cx="0" cy="0"/>
+          <a:chOff x="0" y="0"/>
+          <a:chExt cx="0" cy="0"/>
+        </a:xfrm>
+      </p:grpSpPr>
       <p:pic>
         <p:nvPicPr>
           <p:cNvPr id="23" name="Picture 22">
@@ -3491,7 +4400,7 @@
 </p:sld>
 </file>
 
-<file path=ppt/slides/slide2.xml><?xml version="1.0" encoding="utf-8"?>
+<file path=ppt/slides/slide4.xml><?xml version="1.0" encoding="utf-8"?>
 <p:sld xmlns:a="http://schemas.openxmlformats.org/drawingml/2006/main" xmlns:r="http://schemas.openxmlformats.org/officeDocument/2006/relationships" xmlns:p="http://schemas.openxmlformats.org/presentationml/2006/main">
   <p:cSld>
     <p:spTree>
@@ -3780,7 +4689,7 @@
 </p:sld>
 </file>
 
-<file path=ppt/slides/slide3.xml><?xml version="1.0" encoding="utf-8"?>
+<file path=ppt/slides/slide5.xml><?xml version="1.0" encoding="utf-8"?>
 <p:sld xmlns:a="http://schemas.openxmlformats.org/drawingml/2006/main" xmlns:r="http://schemas.openxmlformats.org/officeDocument/2006/relationships" xmlns:p="http://schemas.openxmlformats.org/presentationml/2006/main">
   <p:cSld>
     <p:spTree>
@@ -4124,7 +5033,7 @@
 </p:sld>
 </file>
 
-<file path=ppt/slides/slide4.xml><?xml version="1.0" encoding="utf-8"?>
+<file path=ppt/slides/slide6.xml><?xml version="1.0" encoding="utf-8"?>
 <p:sld xmlns:a="http://schemas.openxmlformats.org/drawingml/2006/main" xmlns:r="http://schemas.openxmlformats.org/officeDocument/2006/relationships" xmlns:p="http://schemas.openxmlformats.org/presentationml/2006/main">
   <p:cSld>
     <p:spTree>

</xml_diff>